<commit_message>
Tabble and Class boilerplate created
</commit_message>
<xml_diff>
--- a/Look Inna Book Planning.pptx
+++ b/Look Inna Book Planning.pptx
@@ -6881,24 +6881,24 @@
       </p:sp>
       <p:cxnSp>
         <p:nvCxnSpPr>
-          <p:cNvPr id="151" name="Elbow Connector 150">
-            <a:extLst>
-              <a:ext uri="{FF2B5EF4-FFF2-40B4-BE49-F238E27FC236}">
-                <a16:creationId xmlns:a16="http://schemas.microsoft.com/office/drawing/2014/main" id="{D1D6C320-F7C0-754C-B8CF-43C2D2535AD2}"/>
+          <p:cNvPr id="154" name="Elbow Connector 153">
+            <a:extLst>
+              <a:ext uri="{FF2B5EF4-FFF2-40B4-BE49-F238E27FC236}">
+                <a16:creationId xmlns:a16="http://schemas.microsoft.com/office/drawing/2014/main" id="{8DD40D21-5CA7-1844-AFB4-E5CA9145A963}"/>
               </a:ext>
             </a:extLst>
           </p:cNvPr>
           <p:cNvCxnSpPr>
             <a:cxnSpLocks/>
-            <a:stCxn id="152" idx="1"/>
-            <a:endCxn id="153" idx="1"/>
+            <a:stCxn id="155" idx="1"/>
+            <a:endCxn id="156" idx="1"/>
           </p:cNvCxnSpPr>
           <p:nvPr/>
         </p:nvCxnSpPr>
         <p:spPr>
           <a:xfrm rot="10800000" flipV="1">
-            <a:off x="907716" y="414743"/>
-            <a:ext cx="12700" cy="1319577"/>
+            <a:off x="3244698" y="4852611"/>
+            <a:ext cx="12700" cy="872111"/>
           </a:xfrm>
           <a:prstGeom prst="bentConnector3">
             <a:avLst>
@@ -6926,10 +6926,10 @@
       </p:cxnSp>
       <p:sp>
         <p:nvSpPr>
-          <p:cNvPr id="152" name="Rectangle 151">
-            <a:extLst>
-              <a:ext uri="{FF2B5EF4-FFF2-40B4-BE49-F238E27FC236}">
-                <a16:creationId xmlns:a16="http://schemas.microsoft.com/office/drawing/2014/main" id="{DADDFF70-0D6A-A241-BBC9-01A80CB53731}"/>
+          <p:cNvPr id="155" name="Rectangle 154">
+            <a:extLst>
+              <a:ext uri="{FF2B5EF4-FFF2-40B4-BE49-F238E27FC236}">
+                <a16:creationId xmlns:a16="http://schemas.microsoft.com/office/drawing/2014/main" id="{0F565D94-1897-3A48-8E32-F8DF8BB93EA2}"/>
               </a:ext>
             </a:extLst>
           </p:cNvPr>
@@ -6938,7 +6938,7 @@
         </p:nvSpPr>
         <p:spPr>
           <a:xfrm>
-            <a:off x="907716" y="105803"/>
+            <a:off x="3244698" y="4543671"/>
             <a:ext cx="728132" cy="617882"/>
           </a:xfrm>
           <a:prstGeom prst="rect">
@@ -6976,10 +6976,10 @@
       </p:sp>
       <p:sp>
         <p:nvSpPr>
-          <p:cNvPr id="153" name="Rectangle 152">
-            <a:extLst>
-              <a:ext uri="{FF2B5EF4-FFF2-40B4-BE49-F238E27FC236}">
-                <a16:creationId xmlns:a16="http://schemas.microsoft.com/office/drawing/2014/main" id="{A9BEF785-5405-134F-A0E2-77F7FCB9B1D6}"/>
+          <p:cNvPr id="156" name="Rectangle 155">
+            <a:extLst>
+              <a:ext uri="{FF2B5EF4-FFF2-40B4-BE49-F238E27FC236}">
+                <a16:creationId xmlns:a16="http://schemas.microsoft.com/office/drawing/2014/main" id="{905EEC9F-B292-1D44-99EE-E7F388CBCE28}"/>
               </a:ext>
             </a:extLst>
           </p:cNvPr>
@@ -6988,7 +6988,7 @@
         </p:nvSpPr>
         <p:spPr>
           <a:xfrm>
-            <a:off x="907716" y="1425380"/>
+            <a:off x="3244698" y="5415782"/>
             <a:ext cx="728132" cy="617882"/>
           </a:xfrm>
           <a:prstGeom prst="rect">
@@ -7026,28 +7026,28 @@
       </p:sp>
       <p:cxnSp>
         <p:nvCxnSpPr>
-          <p:cNvPr id="154" name="Elbow Connector 153">
-            <a:extLst>
-              <a:ext uri="{FF2B5EF4-FFF2-40B4-BE49-F238E27FC236}">
-                <a16:creationId xmlns:a16="http://schemas.microsoft.com/office/drawing/2014/main" id="{8DD40D21-5CA7-1844-AFB4-E5CA9145A963}"/>
+          <p:cNvPr id="157" name="Elbow Connector 156">
+            <a:extLst>
+              <a:ext uri="{FF2B5EF4-FFF2-40B4-BE49-F238E27FC236}">
+                <a16:creationId xmlns:a16="http://schemas.microsoft.com/office/drawing/2014/main" id="{B1B83389-0EAF-0F49-BBFC-56ABBD7E597F}"/>
               </a:ext>
             </a:extLst>
           </p:cNvPr>
           <p:cNvCxnSpPr>
             <a:cxnSpLocks/>
-            <a:stCxn id="155" idx="1"/>
-            <a:endCxn id="156" idx="1"/>
+            <a:stCxn id="158" idx="3"/>
+            <a:endCxn id="159" idx="3"/>
           </p:cNvCxnSpPr>
           <p:nvPr/>
         </p:nvCxnSpPr>
         <p:spPr>
-          <a:xfrm rot="10800000" flipV="1">
-            <a:off x="3244698" y="4852611"/>
-            <a:ext cx="12700" cy="872111"/>
+          <a:xfrm flipH="1" flipV="1">
+            <a:off x="4516896" y="2782428"/>
+            <a:ext cx="1" cy="1856948"/>
           </a:xfrm>
           <a:prstGeom prst="bentConnector3">
             <a:avLst>
-              <a:gd name="adj1" fmla="val 1800000"/>
+              <a:gd name="adj1" fmla="val -22860000000"/>
             </a:avLst>
           </a:prstGeom>
           <a:ln>
@@ -7071,10 +7071,10 @@
       </p:cxnSp>
       <p:sp>
         <p:nvSpPr>
-          <p:cNvPr id="155" name="Rectangle 154">
-            <a:extLst>
-              <a:ext uri="{FF2B5EF4-FFF2-40B4-BE49-F238E27FC236}">
-                <a16:creationId xmlns:a16="http://schemas.microsoft.com/office/drawing/2014/main" id="{0F565D94-1897-3A48-8E32-F8DF8BB93EA2}"/>
+          <p:cNvPr id="158" name="Rectangle 157">
+            <a:extLst>
+              <a:ext uri="{FF2B5EF4-FFF2-40B4-BE49-F238E27FC236}">
+                <a16:creationId xmlns:a16="http://schemas.microsoft.com/office/drawing/2014/main" id="{329C9EAC-6E2F-5741-BCCE-C86D6FFD6517}"/>
               </a:ext>
             </a:extLst>
           </p:cNvPr>
@@ -7083,7 +7083,7 @@
         </p:nvSpPr>
         <p:spPr>
           <a:xfrm>
-            <a:off x="3244698" y="4543671"/>
+            <a:off x="3788765" y="4330435"/>
             <a:ext cx="728132" cy="617882"/>
           </a:xfrm>
           <a:prstGeom prst="rect">
@@ -7121,10 +7121,10 @@
       </p:sp>
       <p:sp>
         <p:nvSpPr>
-          <p:cNvPr id="156" name="Rectangle 155">
-            <a:extLst>
-              <a:ext uri="{FF2B5EF4-FFF2-40B4-BE49-F238E27FC236}">
-                <a16:creationId xmlns:a16="http://schemas.microsoft.com/office/drawing/2014/main" id="{905EEC9F-B292-1D44-99EE-E7F388CBCE28}"/>
+          <p:cNvPr id="159" name="Rectangle 158">
+            <a:extLst>
+              <a:ext uri="{FF2B5EF4-FFF2-40B4-BE49-F238E27FC236}">
+                <a16:creationId xmlns:a16="http://schemas.microsoft.com/office/drawing/2014/main" id="{02DDC94C-EFB6-8044-BE68-DA3B2B1BE312}"/>
               </a:ext>
             </a:extLst>
           </p:cNvPr>
@@ -7133,587 +7133,7 @@
         </p:nvSpPr>
         <p:spPr>
           <a:xfrm>
-            <a:off x="3244698" y="5415782"/>
-            <a:ext cx="728132" cy="617882"/>
-          </a:xfrm>
-          <a:prstGeom prst="rect">
-            <a:avLst/>
-          </a:prstGeom>
-          <a:noFill/>
-          <a:ln>
-            <a:noFill/>
-          </a:ln>
-        </p:spPr>
-        <p:style>
-          <a:lnRef idx="2">
-            <a:schemeClr val="accent1">
-              <a:shade val="50000"/>
-            </a:schemeClr>
-          </a:lnRef>
-          <a:fillRef idx="1">
-            <a:schemeClr val="accent1"/>
-          </a:fillRef>
-          <a:effectRef idx="0">
-            <a:schemeClr val="accent1"/>
-          </a:effectRef>
-          <a:fontRef idx="minor">
-            <a:schemeClr val="lt1"/>
-          </a:fontRef>
-        </p:style>
-        <p:txBody>
-          <a:bodyPr rtlCol="0" anchor="ctr"/>
-          <a:lstStyle/>
-          <a:p>
-            <a:pPr algn="ctr"/>
-            <a:endParaRPr lang="en-US"/>
-          </a:p>
-        </p:txBody>
-      </p:sp>
-      <p:cxnSp>
-        <p:nvCxnSpPr>
-          <p:cNvPr id="157" name="Elbow Connector 156">
-            <a:extLst>
-              <a:ext uri="{FF2B5EF4-FFF2-40B4-BE49-F238E27FC236}">
-                <a16:creationId xmlns:a16="http://schemas.microsoft.com/office/drawing/2014/main" id="{B1B83389-0EAF-0F49-BBFC-56ABBD7E597F}"/>
-              </a:ext>
-            </a:extLst>
-          </p:cNvPr>
-          <p:cNvCxnSpPr>
-            <a:cxnSpLocks/>
-            <a:stCxn id="158" idx="3"/>
-            <a:endCxn id="159" idx="3"/>
-          </p:cNvCxnSpPr>
-          <p:nvPr/>
-        </p:nvCxnSpPr>
-        <p:spPr>
-          <a:xfrm flipH="1" flipV="1">
-            <a:off x="4516896" y="2782428"/>
-            <a:ext cx="1" cy="1856948"/>
-          </a:xfrm>
-          <a:prstGeom prst="bentConnector3">
-            <a:avLst>
-              <a:gd name="adj1" fmla="val -22860000000"/>
-            </a:avLst>
-          </a:prstGeom>
-          <a:ln>
-            <a:tailEnd type="triangle"/>
-          </a:ln>
-        </p:spPr>
-        <p:style>
-          <a:lnRef idx="1">
-            <a:schemeClr val="accent1"/>
-          </a:lnRef>
-          <a:fillRef idx="0">
-            <a:schemeClr val="accent1"/>
-          </a:fillRef>
-          <a:effectRef idx="0">
-            <a:schemeClr val="accent1"/>
-          </a:effectRef>
-          <a:fontRef idx="minor">
-            <a:schemeClr val="tx1"/>
-          </a:fontRef>
-        </p:style>
-      </p:cxnSp>
-      <p:sp>
-        <p:nvSpPr>
-          <p:cNvPr id="158" name="Rectangle 157">
-            <a:extLst>
-              <a:ext uri="{FF2B5EF4-FFF2-40B4-BE49-F238E27FC236}">
-                <a16:creationId xmlns:a16="http://schemas.microsoft.com/office/drawing/2014/main" id="{329C9EAC-6E2F-5741-BCCE-C86D6FFD6517}"/>
-              </a:ext>
-            </a:extLst>
-          </p:cNvPr>
-          <p:cNvSpPr/>
-          <p:nvPr/>
-        </p:nvSpPr>
-        <p:spPr>
-          <a:xfrm>
-            <a:off x="3788765" y="4330435"/>
-            <a:ext cx="728132" cy="617882"/>
-          </a:xfrm>
-          <a:prstGeom prst="rect">
-            <a:avLst/>
-          </a:prstGeom>
-          <a:noFill/>
-          <a:ln>
-            <a:noFill/>
-          </a:ln>
-        </p:spPr>
-        <p:style>
-          <a:lnRef idx="2">
-            <a:schemeClr val="accent1">
-              <a:shade val="50000"/>
-            </a:schemeClr>
-          </a:lnRef>
-          <a:fillRef idx="1">
-            <a:schemeClr val="accent1"/>
-          </a:fillRef>
-          <a:effectRef idx="0">
-            <a:schemeClr val="accent1"/>
-          </a:effectRef>
-          <a:fontRef idx="minor">
-            <a:schemeClr val="lt1"/>
-          </a:fontRef>
-        </p:style>
-        <p:txBody>
-          <a:bodyPr rtlCol="0" anchor="ctr"/>
-          <a:lstStyle/>
-          <a:p>
-            <a:pPr algn="ctr"/>
-            <a:endParaRPr lang="en-US"/>
-          </a:p>
-        </p:txBody>
-      </p:sp>
-      <p:sp>
-        <p:nvSpPr>
-          <p:cNvPr id="159" name="Rectangle 158">
-            <a:extLst>
-              <a:ext uri="{FF2B5EF4-FFF2-40B4-BE49-F238E27FC236}">
-                <a16:creationId xmlns:a16="http://schemas.microsoft.com/office/drawing/2014/main" id="{02DDC94C-EFB6-8044-BE68-DA3B2B1BE312}"/>
-              </a:ext>
-            </a:extLst>
-          </p:cNvPr>
-          <p:cNvSpPr/>
-          <p:nvPr/>
-        </p:nvSpPr>
-        <p:spPr>
-          <a:xfrm>
             <a:off x="3788764" y="2473487"/>
-            <a:ext cx="728132" cy="617882"/>
-          </a:xfrm>
-          <a:prstGeom prst="rect">
-            <a:avLst/>
-          </a:prstGeom>
-          <a:noFill/>
-          <a:ln>
-            <a:noFill/>
-          </a:ln>
-        </p:spPr>
-        <p:style>
-          <a:lnRef idx="2">
-            <a:schemeClr val="accent1">
-              <a:shade val="50000"/>
-            </a:schemeClr>
-          </a:lnRef>
-          <a:fillRef idx="1">
-            <a:schemeClr val="accent1"/>
-          </a:fillRef>
-          <a:effectRef idx="0">
-            <a:schemeClr val="accent1"/>
-          </a:effectRef>
-          <a:fontRef idx="minor">
-            <a:schemeClr val="lt1"/>
-          </a:fontRef>
-        </p:style>
-        <p:txBody>
-          <a:bodyPr rtlCol="0" anchor="ctr"/>
-          <a:lstStyle/>
-          <a:p>
-            <a:pPr algn="ctr"/>
-            <a:endParaRPr lang="en-US"/>
-          </a:p>
-        </p:txBody>
-      </p:sp>
-      <p:cxnSp>
-        <p:nvCxnSpPr>
-          <p:cNvPr id="185" name="Elbow Connector 184">
-            <a:extLst>
-              <a:ext uri="{FF2B5EF4-FFF2-40B4-BE49-F238E27FC236}">
-                <a16:creationId xmlns:a16="http://schemas.microsoft.com/office/drawing/2014/main" id="{F5561AFD-2DC9-8048-9DA0-17282337939E}"/>
-              </a:ext>
-            </a:extLst>
-          </p:cNvPr>
-          <p:cNvCxnSpPr>
-            <a:cxnSpLocks/>
-            <a:stCxn id="186" idx="1"/>
-            <a:endCxn id="187" idx="1"/>
-          </p:cNvCxnSpPr>
-          <p:nvPr/>
-        </p:nvCxnSpPr>
-        <p:spPr>
-          <a:xfrm rot="10800000" flipV="1">
-            <a:off x="1060116" y="567143"/>
-            <a:ext cx="12700" cy="1319577"/>
-          </a:xfrm>
-          <a:prstGeom prst="bentConnector3">
-            <a:avLst>
-              <a:gd name="adj1" fmla="val 1800000"/>
-            </a:avLst>
-          </a:prstGeom>
-          <a:ln>
-            <a:tailEnd type="triangle"/>
-          </a:ln>
-        </p:spPr>
-        <p:style>
-          <a:lnRef idx="1">
-            <a:schemeClr val="accent1"/>
-          </a:lnRef>
-          <a:fillRef idx="0">
-            <a:schemeClr val="accent1"/>
-          </a:fillRef>
-          <a:effectRef idx="0">
-            <a:schemeClr val="accent1"/>
-          </a:effectRef>
-          <a:fontRef idx="minor">
-            <a:schemeClr val="tx1"/>
-          </a:fontRef>
-        </p:style>
-      </p:cxnSp>
-      <p:sp>
-        <p:nvSpPr>
-          <p:cNvPr id="186" name="Rectangle 185">
-            <a:extLst>
-              <a:ext uri="{FF2B5EF4-FFF2-40B4-BE49-F238E27FC236}">
-                <a16:creationId xmlns:a16="http://schemas.microsoft.com/office/drawing/2014/main" id="{F34CEDB1-165A-BC45-B75D-4D434EABCF8E}"/>
-              </a:ext>
-            </a:extLst>
-          </p:cNvPr>
-          <p:cNvSpPr/>
-          <p:nvPr/>
-        </p:nvSpPr>
-        <p:spPr>
-          <a:xfrm>
-            <a:off x="1060116" y="258203"/>
-            <a:ext cx="728132" cy="617882"/>
-          </a:xfrm>
-          <a:prstGeom prst="rect">
-            <a:avLst/>
-          </a:prstGeom>
-          <a:noFill/>
-          <a:ln>
-            <a:noFill/>
-          </a:ln>
-        </p:spPr>
-        <p:style>
-          <a:lnRef idx="2">
-            <a:schemeClr val="accent1">
-              <a:shade val="50000"/>
-            </a:schemeClr>
-          </a:lnRef>
-          <a:fillRef idx="1">
-            <a:schemeClr val="accent1"/>
-          </a:fillRef>
-          <a:effectRef idx="0">
-            <a:schemeClr val="accent1"/>
-          </a:effectRef>
-          <a:fontRef idx="minor">
-            <a:schemeClr val="lt1"/>
-          </a:fontRef>
-        </p:style>
-        <p:txBody>
-          <a:bodyPr rtlCol="0" anchor="ctr"/>
-          <a:lstStyle/>
-          <a:p>
-            <a:pPr algn="ctr"/>
-            <a:endParaRPr lang="en-US"/>
-          </a:p>
-        </p:txBody>
-      </p:sp>
-      <p:sp>
-        <p:nvSpPr>
-          <p:cNvPr id="187" name="Rectangle 186">
-            <a:extLst>
-              <a:ext uri="{FF2B5EF4-FFF2-40B4-BE49-F238E27FC236}">
-                <a16:creationId xmlns:a16="http://schemas.microsoft.com/office/drawing/2014/main" id="{7AD7F99B-A567-7A46-9E34-638339A6AAC8}"/>
-              </a:ext>
-            </a:extLst>
-          </p:cNvPr>
-          <p:cNvSpPr/>
-          <p:nvPr/>
-        </p:nvSpPr>
-        <p:spPr>
-          <a:xfrm>
-            <a:off x="1060116" y="1577780"/>
-            <a:ext cx="728132" cy="617882"/>
-          </a:xfrm>
-          <a:prstGeom prst="rect">
-            <a:avLst/>
-          </a:prstGeom>
-          <a:noFill/>
-          <a:ln>
-            <a:noFill/>
-          </a:ln>
-        </p:spPr>
-        <p:style>
-          <a:lnRef idx="2">
-            <a:schemeClr val="accent1">
-              <a:shade val="50000"/>
-            </a:schemeClr>
-          </a:lnRef>
-          <a:fillRef idx="1">
-            <a:schemeClr val="accent1"/>
-          </a:fillRef>
-          <a:effectRef idx="0">
-            <a:schemeClr val="accent1"/>
-          </a:effectRef>
-          <a:fontRef idx="minor">
-            <a:schemeClr val="lt1"/>
-          </a:fontRef>
-        </p:style>
-        <p:txBody>
-          <a:bodyPr rtlCol="0" anchor="ctr"/>
-          <a:lstStyle/>
-          <a:p>
-            <a:pPr algn="ctr"/>
-            <a:endParaRPr lang="en-US"/>
-          </a:p>
-        </p:txBody>
-      </p:sp>
-      <p:cxnSp>
-        <p:nvCxnSpPr>
-          <p:cNvPr id="188" name="Elbow Connector 187">
-            <a:extLst>
-              <a:ext uri="{FF2B5EF4-FFF2-40B4-BE49-F238E27FC236}">
-                <a16:creationId xmlns:a16="http://schemas.microsoft.com/office/drawing/2014/main" id="{A67620A5-8C9E-9240-991B-4B952BF4D624}"/>
-              </a:ext>
-            </a:extLst>
-          </p:cNvPr>
-          <p:cNvCxnSpPr>
-            <a:cxnSpLocks/>
-            <a:stCxn id="189" idx="1"/>
-            <a:endCxn id="190" idx="1"/>
-          </p:cNvCxnSpPr>
-          <p:nvPr/>
-        </p:nvCxnSpPr>
-        <p:spPr>
-          <a:xfrm rot="10800000" flipV="1">
-            <a:off x="1212516" y="719543"/>
-            <a:ext cx="12700" cy="1319577"/>
-          </a:xfrm>
-          <a:prstGeom prst="bentConnector3">
-            <a:avLst>
-              <a:gd name="adj1" fmla="val 1800000"/>
-            </a:avLst>
-          </a:prstGeom>
-          <a:ln>
-            <a:tailEnd type="triangle"/>
-          </a:ln>
-        </p:spPr>
-        <p:style>
-          <a:lnRef idx="1">
-            <a:schemeClr val="accent1"/>
-          </a:lnRef>
-          <a:fillRef idx="0">
-            <a:schemeClr val="accent1"/>
-          </a:fillRef>
-          <a:effectRef idx="0">
-            <a:schemeClr val="accent1"/>
-          </a:effectRef>
-          <a:fontRef idx="minor">
-            <a:schemeClr val="tx1"/>
-          </a:fontRef>
-        </p:style>
-      </p:cxnSp>
-      <p:sp>
-        <p:nvSpPr>
-          <p:cNvPr id="189" name="Rectangle 188">
-            <a:extLst>
-              <a:ext uri="{FF2B5EF4-FFF2-40B4-BE49-F238E27FC236}">
-                <a16:creationId xmlns:a16="http://schemas.microsoft.com/office/drawing/2014/main" id="{988B4780-7EB3-4346-817A-A92F83186E56}"/>
-              </a:ext>
-            </a:extLst>
-          </p:cNvPr>
-          <p:cNvSpPr/>
-          <p:nvPr/>
-        </p:nvSpPr>
-        <p:spPr>
-          <a:xfrm>
-            <a:off x="1212516" y="410603"/>
-            <a:ext cx="728132" cy="617882"/>
-          </a:xfrm>
-          <a:prstGeom prst="rect">
-            <a:avLst/>
-          </a:prstGeom>
-          <a:noFill/>
-          <a:ln>
-            <a:noFill/>
-          </a:ln>
-        </p:spPr>
-        <p:style>
-          <a:lnRef idx="2">
-            <a:schemeClr val="accent1">
-              <a:shade val="50000"/>
-            </a:schemeClr>
-          </a:lnRef>
-          <a:fillRef idx="1">
-            <a:schemeClr val="accent1"/>
-          </a:fillRef>
-          <a:effectRef idx="0">
-            <a:schemeClr val="accent1"/>
-          </a:effectRef>
-          <a:fontRef idx="minor">
-            <a:schemeClr val="lt1"/>
-          </a:fontRef>
-        </p:style>
-        <p:txBody>
-          <a:bodyPr rtlCol="0" anchor="ctr"/>
-          <a:lstStyle/>
-          <a:p>
-            <a:pPr algn="ctr"/>
-            <a:endParaRPr lang="en-US"/>
-          </a:p>
-        </p:txBody>
-      </p:sp>
-      <p:sp>
-        <p:nvSpPr>
-          <p:cNvPr id="190" name="Rectangle 189">
-            <a:extLst>
-              <a:ext uri="{FF2B5EF4-FFF2-40B4-BE49-F238E27FC236}">
-                <a16:creationId xmlns:a16="http://schemas.microsoft.com/office/drawing/2014/main" id="{AE160223-2A74-0D43-A030-58D8FCF93B1D}"/>
-              </a:ext>
-            </a:extLst>
-          </p:cNvPr>
-          <p:cNvSpPr/>
-          <p:nvPr/>
-        </p:nvSpPr>
-        <p:spPr>
-          <a:xfrm>
-            <a:off x="1212516" y="1730180"/>
-            <a:ext cx="728132" cy="617882"/>
-          </a:xfrm>
-          <a:prstGeom prst="rect">
-            <a:avLst/>
-          </a:prstGeom>
-          <a:noFill/>
-          <a:ln>
-            <a:noFill/>
-          </a:ln>
-        </p:spPr>
-        <p:style>
-          <a:lnRef idx="2">
-            <a:schemeClr val="accent1">
-              <a:shade val="50000"/>
-            </a:schemeClr>
-          </a:lnRef>
-          <a:fillRef idx="1">
-            <a:schemeClr val="accent1"/>
-          </a:fillRef>
-          <a:effectRef idx="0">
-            <a:schemeClr val="accent1"/>
-          </a:effectRef>
-          <a:fontRef idx="minor">
-            <a:schemeClr val="lt1"/>
-          </a:fontRef>
-        </p:style>
-        <p:txBody>
-          <a:bodyPr rtlCol="0" anchor="ctr"/>
-          <a:lstStyle/>
-          <a:p>
-            <a:pPr algn="ctr"/>
-            <a:endParaRPr lang="en-US"/>
-          </a:p>
-        </p:txBody>
-      </p:sp>
-      <p:cxnSp>
-        <p:nvCxnSpPr>
-          <p:cNvPr id="191" name="Elbow Connector 190">
-            <a:extLst>
-              <a:ext uri="{FF2B5EF4-FFF2-40B4-BE49-F238E27FC236}">
-                <a16:creationId xmlns:a16="http://schemas.microsoft.com/office/drawing/2014/main" id="{A07D5AF6-ED21-9843-B997-3BAE32B045B1}"/>
-              </a:ext>
-            </a:extLst>
-          </p:cNvPr>
-          <p:cNvCxnSpPr>
-            <a:cxnSpLocks/>
-            <a:stCxn id="192" idx="1"/>
-            <a:endCxn id="193" idx="1"/>
-          </p:cNvCxnSpPr>
-          <p:nvPr/>
-        </p:nvCxnSpPr>
-        <p:spPr>
-          <a:xfrm rot="10800000" flipV="1">
-            <a:off x="1364916" y="871943"/>
-            <a:ext cx="12700" cy="1319577"/>
-          </a:xfrm>
-          <a:prstGeom prst="bentConnector3">
-            <a:avLst>
-              <a:gd name="adj1" fmla="val 1800000"/>
-            </a:avLst>
-          </a:prstGeom>
-          <a:ln>
-            <a:tailEnd type="triangle"/>
-          </a:ln>
-        </p:spPr>
-        <p:style>
-          <a:lnRef idx="1">
-            <a:schemeClr val="accent1"/>
-          </a:lnRef>
-          <a:fillRef idx="0">
-            <a:schemeClr val="accent1"/>
-          </a:fillRef>
-          <a:effectRef idx="0">
-            <a:schemeClr val="accent1"/>
-          </a:effectRef>
-          <a:fontRef idx="minor">
-            <a:schemeClr val="tx1"/>
-          </a:fontRef>
-        </p:style>
-      </p:cxnSp>
-      <p:sp>
-        <p:nvSpPr>
-          <p:cNvPr id="192" name="Rectangle 191">
-            <a:extLst>
-              <a:ext uri="{FF2B5EF4-FFF2-40B4-BE49-F238E27FC236}">
-                <a16:creationId xmlns:a16="http://schemas.microsoft.com/office/drawing/2014/main" id="{FA924455-D33F-0745-AF3B-CB67ABAC82AF}"/>
-              </a:ext>
-            </a:extLst>
-          </p:cNvPr>
-          <p:cNvSpPr/>
-          <p:nvPr/>
-        </p:nvSpPr>
-        <p:spPr>
-          <a:xfrm>
-            <a:off x="1364916" y="563003"/>
-            <a:ext cx="728132" cy="617882"/>
-          </a:xfrm>
-          <a:prstGeom prst="rect">
-            <a:avLst/>
-          </a:prstGeom>
-          <a:noFill/>
-          <a:ln>
-            <a:noFill/>
-          </a:ln>
-        </p:spPr>
-        <p:style>
-          <a:lnRef idx="2">
-            <a:schemeClr val="accent1">
-              <a:shade val="50000"/>
-            </a:schemeClr>
-          </a:lnRef>
-          <a:fillRef idx="1">
-            <a:schemeClr val="accent1"/>
-          </a:fillRef>
-          <a:effectRef idx="0">
-            <a:schemeClr val="accent1"/>
-          </a:effectRef>
-          <a:fontRef idx="minor">
-            <a:schemeClr val="lt1"/>
-          </a:fontRef>
-        </p:style>
-        <p:txBody>
-          <a:bodyPr rtlCol="0" anchor="ctr"/>
-          <a:lstStyle/>
-          <a:p>
-            <a:pPr algn="ctr"/>
-            <a:endParaRPr lang="en-US"/>
-          </a:p>
-        </p:txBody>
-      </p:sp>
-      <p:sp>
-        <p:nvSpPr>
-          <p:cNvPr id="193" name="Rectangle 192">
-            <a:extLst>
-              <a:ext uri="{FF2B5EF4-FFF2-40B4-BE49-F238E27FC236}">
-                <a16:creationId xmlns:a16="http://schemas.microsoft.com/office/drawing/2014/main" id="{C9CE5074-BEA7-CE40-965F-AD557049B227}"/>
-              </a:ext>
-            </a:extLst>
-          </p:cNvPr>
-          <p:cNvSpPr/>
-          <p:nvPr/>
-        </p:nvSpPr>
-        <p:spPr>
-          <a:xfrm>
-            <a:off x="1364916" y="1882580"/>
             <a:ext cx="728132" cy="617882"/>
           </a:xfrm>
           <a:prstGeom prst="rect">

</xml_diff>

<commit_message>
Add customer checkout functionality
</commit_message>
<xml_diff>
--- a/Look Inna Book Planning.pptx
+++ b/Look Inna Book Planning.pptx
@@ -273,7 +273,7 @@
           <a:p>
             <a:fld id="{F3F0ABEE-AE24-BC40-9DB6-73EEE3EA7525}" type="datetimeFigureOut">
               <a:rPr lang="en-US" smtClean="0"/>
-              <a:t>12/10/21</a:t>
+              <a:t>12/11/21</a:t>
             </a:fld>
             <a:endParaRPr lang="en-US"/>
           </a:p>
@@ -471,7 +471,7 @@
           <a:p>
             <a:fld id="{F3F0ABEE-AE24-BC40-9DB6-73EEE3EA7525}" type="datetimeFigureOut">
               <a:rPr lang="en-US" smtClean="0"/>
-              <a:t>12/10/21</a:t>
+              <a:t>12/11/21</a:t>
             </a:fld>
             <a:endParaRPr lang="en-US"/>
           </a:p>
@@ -679,7 +679,7 @@
           <a:p>
             <a:fld id="{F3F0ABEE-AE24-BC40-9DB6-73EEE3EA7525}" type="datetimeFigureOut">
               <a:rPr lang="en-US" smtClean="0"/>
-              <a:t>12/10/21</a:t>
+              <a:t>12/11/21</a:t>
             </a:fld>
             <a:endParaRPr lang="en-US"/>
           </a:p>
@@ -877,7 +877,7 @@
           <a:p>
             <a:fld id="{F3F0ABEE-AE24-BC40-9DB6-73EEE3EA7525}" type="datetimeFigureOut">
               <a:rPr lang="en-US" smtClean="0"/>
-              <a:t>12/10/21</a:t>
+              <a:t>12/11/21</a:t>
             </a:fld>
             <a:endParaRPr lang="en-US"/>
           </a:p>
@@ -1152,7 +1152,7 @@
           <a:p>
             <a:fld id="{F3F0ABEE-AE24-BC40-9DB6-73EEE3EA7525}" type="datetimeFigureOut">
               <a:rPr lang="en-US" smtClean="0"/>
-              <a:t>12/10/21</a:t>
+              <a:t>12/11/21</a:t>
             </a:fld>
             <a:endParaRPr lang="en-US"/>
           </a:p>
@@ -1417,7 +1417,7 @@
           <a:p>
             <a:fld id="{F3F0ABEE-AE24-BC40-9DB6-73EEE3EA7525}" type="datetimeFigureOut">
               <a:rPr lang="en-US" smtClean="0"/>
-              <a:t>12/10/21</a:t>
+              <a:t>12/11/21</a:t>
             </a:fld>
             <a:endParaRPr lang="en-US"/>
           </a:p>
@@ -1829,7 +1829,7 @@
           <a:p>
             <a:fld id="{F3F0ABEE-AE24-BC40-9DB6-73EEE3EA7525}" type="datetimeFigureOut">
               <a:rPr lang="en-US" smtClean="0"/>
-              <a:t>12/10/21</a:t>
+              <a:t>12/11/21</a:t>
             </a:fld>
             <a:endParaRPr lang="en-US"/>
           </a:p>
@@ -1970,7 +1970,7 @@
           <a:p>
             <a:fld id="{F3F0ABEE-AE24-BC40-9DB6-73EEE3EA7525}" type="datetimeFigureOut">
               <a:rPr lang="en-US" smtClean="0"/>
-              <a:t>12/10/21</a:t>
+              <a:t>12/11/21</a:t>
             </a:fld>
             <a:endParaRPr lang="en-US"/>
           </a:p>
@@ -2083,7 +2083,7 @@
           <a:p>
             <a:fld id="{F3F0ABEE-AE24-BC40-9DB6-73EEE3EA7525}" type="datetimeFigureOut">
               <a:rPr lang="en-US" smtClean="0"/>
-              <a:t>12/10/21</a:t>
+              <a:t>12/11/21</a:t>
             </a:fld>
             <a:endParaRPr lang="en-US"/>
           </a:p>
@@ -2394,7 +2394,7 @@
           <a:p>
             <a:fld id="{F3F0ABEE-AE24-BC40-9DB6-73EEE3EA7525}" type="datetimeFigureOut">
               <a:rPr lang="en-US" smtClean="0"/>
-              <a:t>12/10/21</a:t>
+              <a:t>12/11/21</a:t>
             </a:fld>
             <a:endParaRPr lang="en-US"/>
           </a:p>
@@ -2682,7 +2682,7 @@
           <a:p>
             <a:fld id="{F3F0ABEE-AE24-BC40-9DB6-73EEE3EA7525}" type="datetimeFigureOut">
               <a:rPr lang="en-US" smtClean="0"/>
-              <a:t>12/10/21</a:t>
+              <a:t>12/11/21</a:t>
             </a:fld>
             <a:endParaRPr lang="en-US"/>
           </a:p>
@@ -2923,7 +2923,7 @@
           <a:p>
             <a:fld id="{F3F0ABEE-AE24-BC40-9DB6-73EEE3EA7525}" type="datetimeFigureOut">
               <a:rPr lang="en-US" smtClean="0"/>
-              <a:t>12/10/21</a:t>
+              <a:t>12/11/21</a:t>
             </a:fld>
             <a:endParaRPr lang="en-US"/>
           </a:p>
@@ -3726,8 +3726,8 @@
         </p:nvSpPr>
         <p:spPr>
           <a:xfrm>
-            <a:off x="7469425" y="4708093"/>
-            <a:ext cx="1273279" cy="856640"/>
+            <a:off x="7469433" y="4838744"/>
+            <a:ext cx="1273279" cy="609576"/>
           </a:xfrm>
           <a:prstGeom prst="rect">
             <a:avLst/>
@@ -3753,12 +3753,6 @@
           <a:p>
             <a:r>
               <a:rPr lang="en-US" sz="1200" u="sng" dirty="0"/>
-              <a:t>customer_id</a:t>
-            </a:r>
-          </a:p>
-          <a:p>
-            <a:r>
-              <a:rPr lang="en-US" sz="1200" dirty="0"/>
               <a:t>name</a:t>
             </a:r>
           </a:p>
@@ -3792,7 +3786,7 @@
         </p:nvSpPr>
         <p:spPr>
           <a:xfrm>
-            <a:off x="7469423" y="4466239"/>
+            <a:off x="7469431" y="4596890"/>
             <a:ext cx="1273279" cy="231913"/>
           </a:xfrm>
           <a:prstGeom prst="rect">
@@ -3977,8 +3971,8 @@
         </p:nvSpPr>
         <p:spPr>
           <a:xfrm>
-            <a:off x="7409187" y="1914486"/>
-            <a:ext cx="1273278" cy="376030"/>
+            <a:off x="7409187" y="1354135"/>
+            <a:ext cx="1273278" cy="978729"/>
           </a:xfrm>
           <a:prstGeom prst="rect">
             <a:avLst/>
@@ -4004,13 +3998,32 @@
           <a:p>
             <a:r>
               <a:rPr lang="en-US" sz="1200" u="sng" dirty="0"/>
-              <a:t>owner_id</a:t>
-            </a:r>
+              <a:t>name</a:t>
+            </a:r>
+            <a:endParaRPr lang="en-US" sz="1200" dirty="0"/>
           </a:p>
           <a:p>
             <a:r>
               <a:rPr lang="en-US" sz="1200" dirty="0"/>
-              <a:t>name</a:t>
+              <a:t>bank_account</a:t>
+            </a:r>
+          </a:p>
+          <a:p>
+            <a:r>
+              <a:rPr lang="en-US" sz="1200" dirty="0"/>
+              <a:t>address</a:t>
+            </a:r>
+          </a:p>
+          <a:p>
+            <a:r>
+              <a:rPr lang="en-US" sz="1200" dirty="0"/>
+              <a:t>email</a:t>
+            </a:r>
+          </a:p>
+          <a:p>
+            <a:r>
+              <a:rPr lang="en-US" sz="1200" dirty="0"/>
+              <a:t>phone_number</a:t>
             </a:r>
           </a:p>
         </p:txBody>
@@ -4029,7 +4042,7 @@
         </p:nvSpPr>
         <p:spPr>
           <a:xfrm>
-            <a:off x="7409184" y="1672631"/>
+            <a:off x="7408600" y="1122222"/>
             <a:ext cx="1273279" cy="231913"/>
           </a:xfrm>
           <a:prstGeom prst="rect">
@@ -4206,9 +4219,9 @@
           <p:nvPr/>
         </p:nvCxnSpPr>
         <p:spPr>
-          <a:xfrm flipV="1">
-            <a:off x="7244209" y="5136413"/>
-            <a:ext cx="225216" cy="4612"/>
+          <a:xfrm>
+            <a:off x="7244209" y="5141025"/>
+            <a:ext cx="225224" cy="2507"/>
           </a:xfrm>
           <a:prstGeom prst="line">
             <a:avLst/>
@@ -4483,8 +4496,8 @@
         </p:nvSpPr>
         <p:spPr>
           <a:xfrm>
-            <a:off x="3460260" y="1380812"/>
-            <a:ext cx="1273278" cy="1186760"/>
+            <a:off x="3453918" y="1226707"/>
+            <a:ext cx="1273278" cy="1133682"/>
           </a:xfrm>
           <a:prstGeom prst="rect">
             <a:avLst/>
@@ -4510,7 +4523,25 @@
           <a:p>
             <a:r>
               <a:rPr lang="en-US" sz="1200" u="sng" dirty="0"/>
-              <a:t>publisher_id</a:t>
+              <a:t>name</a:t>
+            </a:r>
+          </a:p>
+          <a:p>
+            <a:r>
+              <a:rPr lang="en-US" sz="1200" dirty="0"/>
+              <a:t>bank_account</a:t>
+            </a:r>
+          </a:p>
+          <a:p>
+            <a:r>
+              <a:rPr lang="en-US" sz="1200" dirty="0"/>
+              <a:t>balance</a:t>
+            </a:r>
+          </a:p>
+          <a:p>
+            <a:r>
+              <a:rPr lang="en-US" sz="1200" dirty="0"/>
+              <a:t>address</a:t>
             </a:r>
           </a:p>
           <a:p>
@@ -4522,24 +4553,6 @@
           <a:p>
             <a:r>
               <a:rPr lang="en-US" sz="1200" dirty="0"/>
-              <a:t>bank_account</a:t>
-            </a:r>
-          </a:p>
-          <a:p>
-            <a:r>
-              <a:rPr lang="en-US" sz="1200" dirty="0"/>
-              <a:t>address</a:t>
-            </a:r>
-          </a:p>
-          <a:p>
-            <a:r>
-              <a:rPr lang="en-US" sz="1200" dirty="0"/>
-              <a:t>email</a:t>
-            </a:r>
-          </a:p>
-          <a:p>
-            <a:r>
-              <a:rPr lang="en-US" sz="1200" dirty="0"/>
               <a:t>phone_number</a:t>
             </a:r>
           </a:p>
@@ -4559,7 +4572,7 @@
         </p:nvSpPr>
         <p:spPr>
           <a:xfrm>
-            <a:off x="3460255" y="1135843"/>
+            <a:off x="3453918" y="982484"/>
             <a:ext cx="1273279" cy="231913"/>
           </a:xfrm>
           <a:prstGeom prst="rect">
@@ -4608,7 +4621,7 @@
         </p:nvSpPr>
         <p:spPr>
           <a:xfrm>
-            <a:off x="5434722" y="1601475"/>
+            <a:off x="5435354" y="1429054"/>
             <a:ext cx="1273278" cy="745434"/>
           </a:xfrm>
           <a:prstGeom prst="diamond">
@@ -4661,8 +4674,8 @@
         </p:nvCxnSpPr>
         <p:spPr>
           <a:xfrm>
-            <a:off x="6071361" y="2346909"/>
-            <a:ext cx="632" cy="271180"/>
+            <a:off x="6071993" y="2174488"/>
+            <a:ext cx="0" cy="443601"/>
           </a:xfrm>
           <a:prstGeom prst="line">
             <a:avLst/>
@@ -4702,8 +4715,8 @@
         </p:nvCxnSpPr>
         <p:spPr>
           <a:xfrm>
-            <a:off x="4733538" y="1974192"/>
-            <a:ext cx="701184" cy="0"/>
+            <a:off x="4727196" y="1793548"/>
+            <a:ext cx="708158" cy="8223"/>
           </a:xfrm>
           <a:prstGeom prst="line">
             <a:avLst/>
@@ -4742,7 +4755,7 @@
         </p:nvSpPr>
         <p:spPr>
           <a:xfrm>
-            <a:off x="6071361" y="2325619"/>
+            <a:off x="6031432" y="2324910"/>
             <a:ext cx="417102" cy="276999"/>
           </a:xfrm>
           <a:prstGeom prst="rect">
@@ -4758,7 +4771,7 @@
           <a:p>
             <a:r>
               <a:rPr lang="en-US" sz="1200"/>
-              <a:t>0..*</a:t>
+              <a:t>1..*</a:t>
             </a:r>
           </a:p>
         </p:txBody>
@@ -4777,8 +4790,8 @@
         </p:nvSpPr>
         <p:spPr>
           <a:xfrm>
-            <a:off x="4965355" y="1672631"/>
-            <a:ext cx="430543" cy="276999"/>
+            <a:off x="4716506" y="1510885"/>
+            <a:ext cx="242076" cy="276999"/>
           </a:xfrm>
           <a:prstGeom prst="rect">
             <a:avLst/>
@@ -4793,7 +4806,7 @@
           <a:p>
             <a:r>
               <a:rPr lang="en-US" sz="1200"/>
-              <a:t>1..*</a:t>
+              <a:t>1</a:t>
             </a:r>
           </a:p>
         </p:txBody>
@@ -4906,8 +4919,8 @@
         </p:nvCxnSpPr>
         <p:spPr>
           <a:xfrm flipH="1" flipV="1">
-            <a:off x="8045826" y="2290516"/>
-            <a:ext cx="3772" cy="870987"/>
+            <a:off x="8045826" y="2332864"/>
+            <a:ext cx="3772" cy="828639"/>
           </a:xfrm>
           <a:prstGeom prst="line">
             <a:avLst/>
@@ -4981,7 +4994,7 @@
         </p:nvSpPr>
         <p:spPr>
           <a:xfrm>
-            <a:off x="8056011" y="2299193"/>
+            <a:off x="8045240" y="2345218"/>
             <a:ext cx="418704" cy="276999"/>
           </a:xfrm>
           <a:prstGeom prst="rect">
@@ -5016,8 +5029,8 @@
         </p:nvSpPr>
         <p:spPr>
           <a:xfrm>
-            <a:off x="9388639" y="3161502"/>
-            <a:ext cx="1096185" cy="745434"/>
+            <a:off x="9168294" y="3089205"/>
+            <a:ext cx="1096185" cy="890030"/>
           </a:xfrm>
           <a:prstGeom prst="rect">
             <a:avLst/>
@@ -5084,8 +5097,97 @@
         </p:nvCxnSpPr>
         <p:spPr>
           <a:xfrm flipH="1">
-            <a:off x="8927285" y="3534219"/>
-            <a:ext cx="461354" cy="1"/>
+            <a:off x="8927285" y="3534220"/>
+            <a:ext cx="241009" cy="0"/>
+          </a:xfrm>
+          <a:prstGeom prst="line">
+            <a:avLst/>
+          </a:prstGeom>
+          <a:ln w="19050">
+            <a:prstDash val="sysDash"/>
+          </a:ln>
+        </p:spPr>
+        <p:style>
+          <a:lnRef idx="1">
+            <a:schemeClr val="accent1"/>
+          </a:lnRef>
+          <a:fillRef idx="0">
+            <a:schemeClr val="accent1"/>
+          </a:fillRef>
+          <a:effectRef idx="0">
+            <a:schemeClr val="accent1"/>
+          </a:effectRef>
+          <a:fontRef idx="minor">
+            <a:schemeClr val="tx1"/>
+          </a:fontRef>
+        </p:style>
+      </p:cxnSp>
+      <p:sp>
+        <p:nvSpPr>
+          <p:cNvPr id="39" name="Rectangle 38">
+            <a:extLst>
+              <a:ext uri="{FF2B5EF4-FFF2-40B4-BE49-F238E27FC236}">
+                <a16:creationId xmlns:a16="http://schemas.microsoft.com/office/drawing/2014/main" id="{CAEC64D6-BC25-1D4C-99D2-9BD11DDACCE9}"/>
+              </a:ext>
+            </a:extLst>
+          </p:cNvPr>
+          <p:cNvSpPr/>
+          <p:nvPr/>
+        </p:nvSpPr>
+        <p:spPr>
+          <a:xfrm>
+            <a:off x="3546295" y="2734045"/>
+            <a:ext cx="1096185" cy="269908"/>
+          </a:xfrm>
+          <a:prstGeom prst="rect">
+            <a:avLst/>
+          </a:prstGeom>
+        </p:spPr>
+        <p:style>
+          <a:lnRef idx="2">
+            <a:schemeClr val="accent1"/>
+          </a:lnRef>
+          <a:fillRef idx="1">
+            <a:schemeClr val="lt1"/>
+          </a:fillRef>
+          <a:effectRef idx="0">
+            <a:schemeClr val="accent1"/>
+          </a:effectRef>
+          <a:fontRef idx="minor">
+            <a:schemeClr val="dk1"/>
+          </a:fontRef>
+        </p:style>
+        <p:txBody>
+          <a:bodyPr rtlCol="0" anchor="ctr"/>
+          <a:lstStyle/>
+          <a:p>
+            <a:r>
+              <a:rPr lang="en-US" sz="1200" dirty="0"/>
+              <a:t>unit_ordered</a:t>
+            </a:r>
+          </a:p>
+        </p:txBody>
+      </p:sp>
+      <p:cxnSp>
+        <p:nvCxnSpPr>
+          <p:cNvPr id="40" name="Straight Connector 39">
+            <a:extLst>
+              <a:ext uri="{FF2B5EF4-FFF2-40B4-BE49-F238E27FC236}">
+                <a16:creationId xmlns:a16="http://schemas.microsoft.com/office/drawing/2014/main" id="{EF883C19-B7EA-0747-AA08-AA3C50C1E89C}"/>
+              </a:ext>
+            </a:extLst>
+          </p:cNvPr>
+          <p:cNvCxnSpPr>
+            <a:cxnSpLocks/>
+            <a:stCxn id="82" idx="0"/>
+            <a:endCxn id="39" idx="2"/>
+          </p:cNvCxnSpPr>
+          <p:nvPr/>
+        </p:nvCxnSpPr>
+        <p:spPr>
+          <a:xfrm flipH="1" flipV="1">
+            <a:off x="4094388" y="3003953"/>
+            <a:ext cx="1" cy="157550"/>
           </a:xfrm>
           <a:prstGeom prst="line">
             <a:avLst/>
@@ -5153,8 +5255,8 @@
         </p:nvSpPr>
         <p:spPr>
           <a:xfrm>
-            <a:off x="3249387" y="1160360"/>
-            <a:ext cx="1273278" cy="385972"/>
+            <a:off x="3249387" y="1160359"/>
+            <a:ext cx="1273278" cy="581643"/>
           </a:xfrm>
           <a:prstGeom prst="rect">
             <a:avLst/>
@@ -5189,6 +5291,12 @@
               <a:t>order_id</a:t>
             </a:r>
           </a:p>
+          <a:p>
+            <a:r>
+              <a:rPr lang="en-US" sz="1200" dirty="0"/>
+              <a:t>unit_ordered</a:t>
+            </a:r>
+          </a:p>
         </p:txBody>
       </p:sp>
       <p:sp>
@@ -5206,7 +5314,7 @@
         <p:spPr>
           <a:xfrm>
             <a:off x="5462248" y="2671683"/>
-            <a:ext cx="1273278" cy="1148058"/>
+            <a:ext cx="1273278" cy="1339302"/>
           </a:xfrm>
           <a:prstGeom prst="rect">
             <a:avLst/>
@@ -5238,7 +5346,13 @@
           <a:p>
             <a:r>
               <a:rPr lang="en-US" sz="1200" dirty="0"/>
-              <a:t>name</a:t>
+              <a:t>publisher_name</a:t>
+            </a:r>
+          </a:p>
+          <a:p>
+            <a:r>
+              <a:rPr lang="en-US" sz="1200" dirty="0"/>
+              <a:t>book_name</a:t>
             </a:r>
           </a:p>
           <a:p>
@@ -5331,7 +5445,7 @@
         <p:spPr>
           <a:xfrm>
             <a:off x="3249386" y="5559620"/>
-            <a:ext cx="1273279" cy="856640"/>
+            <a:ext cx="1273279" cy="642358"/>
           </a:xfrm>
           <a:prstGeom prst="rect">
             <a:avLst/>
@@ -5357,12 +5471,6 @@
           <a:p>
             <a:r>
               <a:rPr lang="en-US" sz="1200" u="sng" dirty="0"/>
-              <a:t>customer_id</a:t>
-            </a:r>
-          </a:p>
-          <a:p>
-            <a:r>
-              <a:rPr lang="en-US" sz="1200" dirty="0"/>
               <a:t>name</a:t>
             </a:r>
           </a:p>
@@ -5582,7 +5690,7 @@
         <p:spPr>
           <a:xfrm>
             <a:off x="7621224" y="4551839"/>
-            <a:ext cx="1273278" cy="385972"/>
+            <a:ext cx="1273278" cy="997840"/>
           </a:xfrm>
           <a:prstGeom prst="rect">
             <a:avLst/>
@@ -5608,13 +5716,31 @@
           <a:p>
             <a:r>
               <a:rPr lang="en-US" sz="1200" u="sng" dirty="0"/>
-              <a:t>owner_id</a:t>
+              <a:t>name</a:t>
             </a:r>
           </a:p>
           <a:p>
             <a:r>
               <a:rPr lang="en-US" sz="1200" dirty="0"/>
-              <a:t>name</a:t>
+              <a:t>bank_account</a:t>
+            </a:r>
+          </a:p>
+          <a:p>
+            <a:r>
+              <a:rPr lang="en-US" sz="1200" dirty="0"/>
+              <a:t>address</a:t>
+            </a:r>
+          </a:p>
+          <a:p>
+            <a:r>
+              <a:rPr lang="en-US" sz="1200" dirty="0"/>
+              <a:t>email</a:t>
+            </a:r>
+          </a:p>
+          <a:p>
+            <a:r>
+              <a:rPr lang="en-US" sz="1200" dirty="0"/>
+              <a:t>phone_number</a:t>
             </a:r>
           </a:p>
         </p:txBody>
@@ -5682,8 +5808,8 @@
         </p:nvSpPr>
         <p:spPr>
           <a:xfrm>
-            <a:off x="7621229" y="852004"/>
-            <a:ext cx="1273278" cy="1186760"/>
+            <a:off x="5475869" y="790948"/>
+            <a:ext cx="1273283" cy="1102974"/>
           </a:xfrm>
           <a:prstGeom prst="rect">
             <a:avLst/>
@@ -5709,7 +5835,7 @@
           <a:p>
             <a:r>
               <a:rPr lang="en-US" sz="1200" u="sng" dirty="0"/>
-              <a:t>publisher_id</a:t>
+              <a:t>name</a:t>
             </a:r>
           </a:p>
           <a:p>
@@ -5727,13 +5853,13 @@
           <a:p>
             <a:r>
               <a:rPr lang="en-US" sz="1200" dirty="0"/>
+              <a:t>balance</a:t>
+            </a:r>
+          </a:p>
+          <a:p>
+            <a:r>
+              <a:rPr lang="en-US" sz="1200" dirty="0"/>
               <a:t>address</a:t>
-            </a:r>
-          </a:p>
-          <a:p>
-            <a:r>
-              <a:rPr lang="en-US" sz="1200" dirty="0"/>
-              <a:t>email</a:t>
             </a:r>
           </a:p>
           <a:p>
@@ -5758,7 +5884,7 @@
         </p:nvSpPr>
         <p:spPr>
           <a:xfrm>
-            <a:off x="7621224" y="607035"/>
+            <a:off x="5475873" y="541316"/>
             <a:ext cx="1273279" cy="231913"/>
           </a:xfrm>
           <a:prstGeom prst="rect">
@@ -5795,10 +5921,10 @@
       </p:sp>
       <p:sp>
         <p:nvSpPr>
-          <p:cNvPr id="37" name="Rectangle 36">
-            <a:extLst>
-              <a:ext uri="{FF2B5EF4-FFF2-40B4-BE49-F238E27FC236}">
-                <a16:creationId xmlns:a16="http://schemas.microsoft.com/office/drawing/2014/main" id="{5C220A37-D114-FF48-A819-A97418998FE0}"/>
+          <p:cNvPr id="40" name="Rectangle 39">
+            <a:extLst>
+              <a:ext uri="{FF2B5EF4-FFF2-40B4-BE49-F238E27FC236}">
+                <a16:creationId xmlns:a16="http://schemas.microsoft.com/office/drawing/2014/main" id="{921064CE-D76E-F147-8DC7-05A238EA0515}"/>
               </a:ext>
             </a:extLst>
           </p:cNvPr>
@@ -5807,60 +5933,8 @@
         </p:nvSpPr>
         <p:spPr>
           <a:xfrm>
-            <a:off x="5469176" y="1160359"/>
-            <a:ext cx="1273278" cy="385970"/>
-          </a:xfrm>
-          <a:prstGeom prst="rect">
-            <a:avLst/>
-          </a:prstGeom>
-        </p:spPr>
-        <p:style>
-          <a:lnRef idx="2">
-            <a:schemeClr val="accent1"/>
-          </a:lnRef>
-          <a:fillRef idx="1">
-            <a:schemeClr val="lt1"/>
-          </a:fillRef>
-          <a:effectRef idx="0">
-            <a:schemeClr val="accent1"/>
-          </a:effectRef>
-          <a:fontRef idx="minor">
-            <a:schemeClr val="dk1"/>
-          </a:fontRef>
-        </p:style>
-        <p:txBody>
-          <a:bodyPr rtlCol="0" anchor="ctr"/>
-          <a:lstStyle/>
-          <a:p>
-            <a:r>
-              <a:rPr lang="en-US" sz="1200" u="sng" dirty="0"/>
-              <a:t>publisher_id</a:t>
-            </a:r>
-          </a:p>
-          <a:p>
-            <a:r>
-              <a:rPr lang="en-US" sz="1200" u="sng" dirty="0"/>
-              <a:t>ISBN</a:t>
-            </a:r>
-          </a:p>
-        </p:txBody>
-      </p:sp>
-      <p:sp>
-        <p:nvSpPr>
-          <p:cNvPr id="38" name="Rectangle 37">
-            <a:extLst>
-              <a:ext uri="{FF2B5EF4-FFF2-40B4-BE49-F238E27FC236}">
-                <a16:creationId xmlns:a16="http://schemas.microsoft.com/office/drawing/2014/main" id="{8C9CF0A7-6816-E842-8BB0-7504E4E3785F}"/>
-              </a:ext>
-            </a:extLst>
-          </p:cNvPr>
-          <p:cNvSpPr/>
-          <p:nvPr/>
-        </p:nvSpPr>
-        <p:spPr>
-          <a:xfrm>
-            <a:off x="5469173" y="928447"/>
-            <a:ext cx="1273279" cy="231912"/>
+            <a:off x="3249384" y="928447"/>
+            <a:ext cx="1273279" cy="231913"/>
           </a:xfrm>
           <a:prstGeom prst="rect">
             <a:avLst/>
@@ -5889,17 +5963,17 @@
             <a:pPr algn="ctr"/>
             <a:r>
               <a:rPr lang="en-US" sz="1200" dirty="0"/>
-              <a:t>Publish</a:t>
-            </a:r>
-          </a:p>
-        </p:txBody>
-      </p:sp>
-      <p:sp>
-        <p:nvSpPr>
-          <p:cNvPr id="40" name="Rectangle 39">
-            <a:extLst>
-              <a:ext uri="{FF2B5EF4-FFF2-40B4-BE49-F238E27FC236}">
-                <a16:creationId xmlns:a16="http://schemas.microsoft.com/office/drawing/2014/main" id="{921064CE-D76E-F147-8DC7-05A238EA0515}"/>
+              <a:t>OrderBook</a:t>
+            </a:r>
+          </a:p>
+        </p:txBody>
+      </p:sp>
+      <p:sp>
+        <p:nvSpPr>
+          <p:cNvPr id="41" name="Rectangle 40">
+            <a:extLst>
+              <a:ext uri="{FF2B5EF4-FFF2-40B4-BE49-F238E27FC236}">
+                <a16:creationId xmlns:a16="http://schemas.microsoft.com/office/drawing/2014/main" id="{89F358C0-E554-DD45-95C7-7EBD12AD86BA}"/>
               </a:ext>
             </a:extLst>
           </p:cNvPr>
@@ -5908,7 +5982,59 @@
         </p:nvSpPr>
         <p:spPr>
           <a:xfrm>
-            <a:off x="3249384" y="928447"/>
+            <a:off x="3249389" y="4551839"/>
+            <a:ext cx="1273278" cy="385972"/>
+          </a:xfrm>
+          <a:prstGeom prst="rect">
+            <a:avLst/>
+          </a:prstGeom>
+        </p:spPr>
+        <p:style>
+          <a:lnRef idx="2">
+            <a:schemeClr val="accent1"/>
+          </a:lnRef>
+          <a:fillRef idx="1">
+            <a:schemeClr val="lt1"/>
+          </a:fillRef>
+          <a:effectRef idx="0">
+            <a:schemeClr val="accent1"/>
+          </a:effectRef>
+          <a:fontRef idx="minor">
+            <a:schemeClr val="dk1"/>
+          </a:fontRef>
+        </p:style>
+        <p:txBody>
+          <a:bodyPr rtlCol="0" anchor="ctr"/>
+          <a:lstStyle/>
+          <a:p>
+            <a:r>
+              <a:rPr lang="en-US" sz="1200" u="sng" dirty="0"/>
+              <a:t>order_id</a:t>
+            </a:r>
+          </a:p>
+          <a:p>
+            <a:r>
+              <a:rPr lang="en-US" sz="1200" dirty="0"/>
+              <a:t>customer_name</a:t>
+            </a:r>
+          </a:p>
+        </p:txBody>
+      </p:sp>
+      <p:sp>
+        <p:nvSpPr>
+          <p:cNvPr id="42" name="Rectangle 41">
+            <a:extLst>
+              <a:ext uri="{FF2B5EF4-FFF2-40B4-BE49-F238E27FC236}">
+                <a16:creationId xmlns:a16="http://schemas.microsoft.com/office/drawing/2014/main" id="{3DA0067E-6245-864B-B744-74686D4237F3}"/>
+              </a:ext>
+            </a:extLst>
+          </p:cNvPr>
+          <p:cNvSpPr/>
+          <p:nvPr/>
+        </p:nvSpPr>
+        <p:spPr>
+          <a:xfrm>
+            <a:off x="3249386" y="4319926"/>
             <a:ext cx="1273279" cy="231913"/>
           </a:xfrm>
           <a:prstGeom prst="rect">
@@ -5938,17 +6064,17 @@
             <a:pPr algn="ctr"/>
             <a:r>
               <a:rPr lang="en-US" sz="1200" dirty="0"/>
-              <a:t>OrderBook</a:t>
-            </a:r>
-          </a:p>
-        </p:txBody>
-      </p:sp>
-      <p:sp>
-        <p:nvSpPr>
-          <p:cNvPr id="41" name="Rectangle 40">
-            <a:extLst>
-              <a:ext uri="{FF2B5EF4-FFF2-40B4-BE49-F238E27FC236}">
-                <a16:creationId xmlns:a16="http://schemas.microsoft.com/office/drawing/2014/main" id="{89F358C0-E554-DD45-95C7-7EBD12AD86BA}"/>
+              <a:t>CustomerOrder</a:t>
+            </a:r>
+          </a:p>
+        </p:txBody>
+      </p:sp>
+      <p:sp>
+        <p:nvSpPr>
+          <p:cNvPr id="43" name="Rectangle 42">
+            <a:extLst>
+              <a:ext uri="{FF2B5EF4-FFF2-40B4-BE49-F238E27FC236}">
+                <a16:creationId xmlns:a16="http://schemas.microsoft.com/office/drawing/2014/main" id="{400E5B01-756E-4A44-911D-6E22FDF32D78}"/>
               </a:ext>
             </a:extLst>
           </p:cNvPr>
@@ -5957,8 +6083,8 @@
         </p:nvSpPr>
         <p:spPr>
           <a:xfrm>
-            <a:off x="3249389" y="4551839"/>
-            <a:ext cx="1273278" cy="385972"/>
+            <a:off x="7621230" y="2653193"/>
+            <a:ext cx="1273278" cy="1148058"/>
           </a:xfrm>
           <a:prstGeom prst="rect">
             <a:avLst/>
@@ -5983,24 +6109,49 @@
           <a:lstStyle/>
           <a:p>
             <a:r>
-              <a:rPr lang="en-US" sz="1200" u="sng" dirty="0"/>
-              <a:t>order_id</a:t>
-            </a:r>
-          </a:p>
-          <a:p>
-            <a:r>
-              <a:rPr lang="en-US" sz="1200" dirty="0"/>
-              <a:t>customer_id</a:t>
-            </a:r>
-          </a:p>
-        </p:txBody>
-      </p:sp>
-      <p:sp>
-        <p:nvSpPr>
-          <p:cNvPr id="42" name="Rectangle 41">
-            <a:extLst>
-              <a:ext uri="{FF2B5EF4-FFF2-40B4-BE49-F238E27FC236}">
-                <a16:creationId xmlns:a16="http://schemas.microsoft.com/office/drawing/2014/main" id="{3DA0067E-6245-864B-B744-74686D4237F3}"/>
+              <a:rPr lang="en-CA" sz="1200" u="sng"/>
+              <a:t>ISBN</a:t>
+            </a:r>
+          </a:p>
+          <a:p>
+            <a:r>
+              <a:rPr lang="en-CA" sz="1200"/>
+              <a:t>owner_name</a:t>
+            </a:r>
+          </a:p>
+          <a:p>
+            <a:r>
+              <a:rPr lang="en-CA" sz="1200"/>
+              <a:t>unit_in_stock</a:t>
+            </a:r>
+          </a:p>
+          <a:p>
+            <a:r>
+              <a:rPr lang="en-CA" sz="1200"/>
+              <a:t>unit_sold </a:t>
+            </a:r>
+          </a:p>
+          <a:p>
+            <a:r>
+              <a:rPr lang="en-CA" sz="1200"/>
+              <a:t>revenue</a:t>
+            </a:r>
+          </a:p>
+          <a:p>
+            <a:r>
+              <a:rPr lang="en-CA" sz="1200"/>
+              <a:t>publisher_split </a:t>
+            </a:r>
+            <a:endParaRPr lang="en-US" sz="1200" dirty="0"/>
+          </a:p>
+        </p:txBody>
+      </p:sp>
+      <p:sp>
+        <p:nvSpPr>
+          <p:cNvPr id="44" name="Rectangle 43">
+            <a:extLst>
+              <a:ext uri="{FF2B5EF4-FFF2-40B4-BE49-F238E27FC236}">
+                <a16:creationId xmlns:a16="http://schemas.microsoft.com/office/drawing/2014/main" id="{5DEE348E-512A-7B44-ADAB-91A62C8AD32C}"/>
               </a:ext>
             </a:extLst>
           </p:cNvPr>
@@ -6009,7 +6160,7 @@
         </p:nvSpPr>
         <p:spPr>
           <a:xfrm>
-            <a:off x="3249386" y="4319926"/>
+            <a:off x="7621229" y="2411341"/>
             <a:ext cx="1273279" cy="231913"/>
           </a:xfrm>
           <a:prstGeom prst="rect">
@@ -6039,17 +6190,17 @@
             <a:pPr algn="ctr"/>
             <a:r>
               <a:rPr lang="en-US" sz="1200" dirty="0"/>
-              <a:t>CustomerOrder</a:t>
-            </a:r>
-          </a:p>
-        </p:txBody>
-      </p:sp>
-      <p:sp>
-        <p:nvSpPr>
-          <p:cNvPr id="43" name="Rectangle 42">
-            <a:extLst>
-              <a:ext uri="{FF2B5EF4-FFF2-40B4-BE49-F238E27FC236}">
-                <a16:creationId xmlns:a16="http://schemas.microsoft.com/office/drawing/2014/main" id="{400E5B01-756E-4A44-911D-6E22FDF32D78}"/>
+              <a:t>Collect</a:t>
+            </a:r>
+          </a:p>
+        </p:txBody>
+      </p:sp>
+      <p:sp>
+        <p:nvSpPr>
+          <p:cNvPr id="45" name="Rectangle 44">
+            <a:extLst>
+              <a:ext uri="{FF2B5EF4-FFF2-40B4-BE49-F238E27FC236}">
+                <a16:creationId xmlns:a16="http://schemas.microsoft.com/office/drawing/2014/main" id="{4179DB74-B503-534E-93CE-96865347B2A6}"/>
               </a:ext>
             </a:extLst>
           </p:cNvPr>
@@ -6058,8 +6209,8 @@
         </p:nvSpPr>
         <p:spPr>
           <a:xfrm>
-            <a:off x="7621230" y="2653193"/>
-            <a:ext cx="1273278" cy="1148058"/>
+            <a:off x="5468593" y="4734887"/>
+            <a:ext cx="1273278" cy="426666"/>
           </a:xfrm>
           <a:prstGeom prst="rect">
             <a:avLst/>
@@ -6084,31 +6235,24 @@
           <a:lstStyle/>
           <a:p>
             <a:r>
-              <a:rPr lang="en-CA" sz="1200" u="sng"/>
+              <a:rPr lang="en-US" sz="1200" u="sng" dirty="0"/>
               <a:t>ISBN</a:t>
             </a:r>
           </a:p>
           <a:p>
             <a:r>
-              <a:rPr lang="en-CA" sz="1200"/>
-              <a:t>owner_id unit_in_stock, unit_sold revenue</a:t>
-            </a:r>
-          </a:p>
-          <a:p>
-            <a:r>
-              <a:rPr lang="en-CA" sz="1200"/>
-              <a:t>publisher_split </a:t>
-            </a:r>
-            <a:endParaRPr lang="en-US" sz="1200" dirty="0"/>
-          </a:p>
-        </p:txBody>
-      </p:sp>
-      <p:sp>
-        <p:nvSpPr>
-          <p:cNvPr id="44" name="Rectangle 43">
-            <a:extLst>
-              <a:ext uri="{FF2B5EF4-FFF2-40B4-BE49-F238E27FC236}">
-                <a16:creationId xmlns:a16="http://schemas.microsoft.com/office/drawing/2014/main" id="{5DEE348E-512A-7B44-ADAB-91A62C8AD32C}"/>
+              <a:rPr lang="en-US" sz="1200" u="sng" dirty="0"/>
+              <a:t>name</a:t>
+            </a:r>
+          </a:p>
+        </p:txBody>
+      </p:sp>
+      <p:sp>
+        <p:nvSpPr>
+          <p:cNvPr id="46" name="Rectangle 45">
+            <a:extLst>
+              <a:ext uri="{FF2B5EF4-FFF2-40B4-BE49-F238E27FC236}">
+                <a16:creationId xmlns:a16="http://schemas.microsoft.com/office/drawing/2014/main" id="{5D5FBB13-1510-BB49-80D4-333F504B7110}"/>
               </a:ext>
             </a:extLst>
           </p:cNvPr>
@@ -6117,114 +6261,7 @@
         </p:nvSpPr>
         <p:spPr>
           <a:xfrm>
-            <a:off x="7621229" y="2411341"/>
-            <a:ext cx="1273279" cy="231913"/>
-          </a:xfrm>
-          <a:prstGeom prst="rect">
-            <a:avLst/>
-          </a:prstGeom>
-        </p:spPr>
-        <p:style>
-          <a:lnRef idx="2">
-            <a:schemeClr val="accent1">
-              <a:shade val="50000"/>
-            </a:schemeClr>
-          </a:lnRef>
-          <a:fillRef idx="1">
-            <a:schemeClr val="accent1"/>
-          </a:fillRef>
-          <a:effectRef idx="0">
-            <a:schemeClr val="accent1"/>
-          </a:effectRef>
-          <a:fontRef idx="minor">
-            <a:schemeClr val="lt1"/>
-          </a:fontRef>
-        </p:style>
-        <p:txBody>
-          <a:bodyPr rtlCol="0" anchor="ctr"/>
-          <a:lstStyle/>
-          <a:p>
-            <a:pPr algn="ctr"/>
-            <a:r>
-              <a:rPr lang="en-US" sz="1200" dirty="0"/>
-              <a:t>Collect</a:t>
-            </a:r>
-          </a:p>
-        </p:txBody>
-      </p:sp>
-      <p:sp>
-        <p:nvSpPr>
-          <p:cNvPr id="45" name="Rectangle 44">
-            <a:extLst>
-              <a:ext uri="{FF2B5EF4-FFF2-40B4-BE49-F238E27FC236}">
-                <a16:creationId xmlns:a16="http://schemas.microsoft.com/office/drawing/2014/main" id="{4179DB74-B503-534E-93CE-96865347B2A6}"/>
-              </a:ext>
-            </a:extLst>
-          </p:cNvPr>
-          <p:cNvSpPr/>
-          <p:nvPr/>
-        </p:nvSpPr>
-        <p:spPr>
-          <a:xfrm>
-            <a:off x="5462245" y="4553114"/>
-            <a:ext cx="1273278" cy="574490"/>
-          </a:xfrm>
-          <a:prstGeom prst="rect">
-            <a:avLst/>
-          </a:prstGeom>
-        </p:spPr>
-        <p:style>
-          <a:lnRef idx="2">
-            <a:schemeClr val="accent1"/>
-          </a:lnRef>
-          <a:fillRef idx="1">
-            <a:schemeClr val="lt1"/>
-          </a:fillRef>
-          <a:effectRef idx="0">
-            <a:schemeClr val="accent1"/>
-          </a:effectRef>
-          <a:fontRef idx="minor">
-            <a:schemeClr val="dk1"/>
-          </a:fontRef>
-        </p:style>
-        <p:txBody>
-          <a:bodyPr rtlCol="0" anchor="ctr"/>
-          <a:lstStyle/>
-          <a:p>
-            <a:r>
-              <a:rPr lang="en-US" sz="1200" u="sng" dirty="0"/>
-              <a:t>author_id</a:t>
-            </a:r>
-          </a:p>
-          <a:p>
-            <a:r>
-              <a:rPr lang="en-US" sz="1200" u="sng" dirty="0"/>
-              <a:t>ISBN</a:t>
-            </a:r>
-          </a:p>
-          <a:p>
-            <a:r>
-              <a:rPr lang="en-US" sz="1200" dirty="0"/>
-              <a:t>name</a:t>
-            </a:r>
-          </a:p>
-        </p:txBody>
-      </p:sp>
-      <p:sp>
-        <p:nvSpPr>
-          <p:cNvPr id="46" name="Rectangle 45">
-            <a:extLst>
-              <a:ext uri="{FF2B5EF4-FFF2-40B4-BE49-F238E27FC236}">
-                <a16:creationId xmlns:a16="http://schemas.microsoft.com/office/drawing/2014/main" id="{5D5FBB13-1510-BB49-80D4-333F504B7110}"/>
-              </a:ext>
-            </a:extLst>
-          </p:cNvPr>
-          <p:cNvSpPr/>
-          <p:nvPr/>
-        </p:nvSpPr>
-        <p:spPr>
-          <a:xfrm>
-            <a:off x="5462245" y="4319926"/>
+            <a:off x="5468593" y="4501699"/>
             <a:ext cx="1273279" cy="231913"/>
           </a:xfrm>
           <a:prstGeom prst="rect">
@@ -6317,16 +6354,17 @@
         </p:nvCxnSpPr>
         <p:spPr>
           <a:xfrm rot="10800000" flipH="1" flipV="1">
-            <a:off x="5468015" y="1450336"/>
-            <a:ext cx="1157" cy="1261910"/>
+            <a:off x="5468593" y="910241"/>
+            <a:ext cx="580" cy="2067801"/>
           </a:xfrm>
           <a:prstGeom prst="bentConnector3">
             <a:avLst>
-              <a:gd name="adj1" fmla="val -19757995"/>
+              <a:gd name="adj1" fmla="val -39413793"/>
             </a:avLst>
           </a:prstGeom>
           <a:ln>
-            <a:tailEnd type="triangle"/>
+            <a:headEnd type="triangle" w="med" len="med"/>
+            <a:tailEnd type="none" w="med" len="med"/>
           </a:ln>
         </p:spPr>
         <p:style>
@@ -6358,7 +6396,7 @@
         </p:nvSpPr>
         <p:spPr>
           <a:xfrm>
-            <a:off x="5468016" y="1141395"/>
+            <a:off x="5468593" y="601301"/>
             <a:ext cx="728132" cy="617882"/>
           </a:xfrm>
           <a:prstGeom prst="rect">
@@ -6408,7 +6446,7 @@
         </p:nvSpPr>
         <p:spPr>
           <a:xfrm>
-            <a:off x="5469173" y="2403305"/>
+            <a:off x="5469173" y="2669102"/>
             <a:ext cx="728132" cy="617882"/>
           </a:xfrm>
           <a:prstGeom prst="rect">
@@ -6462,12 +6500,12 @@
         </p:nvCxnSpPr>
         <p:spPr>
           <a:xfrm rot="10800000" flipH="1">
-            <a:off x="5459235" y="2859155"/>
-            <a:ext cx="9357" cy="1996680"/>
+            <a:off x="5459236" y="2810135"/>
+            <a:ext cx="412" cy="2045700"/>
           </a:xfrm>
           <a:prstGeom prst="bentConnector3">
             <a:avLst>
-              <a:gd name="adj1" fmla="val -2986000"/>
+              <a:gd name="adj1" fmla="val -111911408"/>
             </a:avLst>
           </a:prstGeom>
           <a:ln>
@@ -6553,7 +6591,7 @@
         </p:nvSpPr>
         <p:spPr>
           <a:xfrm>
-            <a:off x="5468593" y="2550214"/>
+            <a:off x="5459648" y="2501194"/>
             <a:ext cx="728132" cy="617882"/>
           </a:xfrm>
           <a:prstGeom prst="rect">
@@ -6608,7 +6646,7 @@
         <p:spPr>
           <a:xfrm>
             <a:off x="4516897" y="1231526"/>
-            <a:ext cx="952276" cy="1556463"/>
+            <a:ext cx="942751" cy="1508940"/>
           </a:xfrm>
           <a:prstGeom prst="bentConnector3">
             <a:avLst>
@@ -6698,7 +6736,7 @@
         </p:nvSpPr>
         <p:spPr>
           <a:xfrm>
-            <a:off x="5469173" y="2479048"/>
+            <a:off x="5459648" y="2431525"/>
             <a:ext cx="728132" cy="617882"/>
           </a:xfrm>
           <a:prstGeom prst="rect">
@@ -7134,152 +7172,6 @@
         <p:spPr>
           <a:xfrm>
             <a:off x="3788764" y="2473487"/>
-            <a:ext cx="728132" cy="617882"/>
-          </a:xfrm>
-          <a:prstGeom prst="rect">
-            <a:avLst/>
-          </a:prstGeom>
-          <a:noFill/>
-          <a:ln>
-            <a:noFill/>
-          </a:ln>
-        </p:spPr>
-        <p:style>
-          <a:lnRef idx="2">
-            <a:schemeClr val="accent1">
-              <a:shade val="50000"/>
-            </a:schemeClr>
-          </a:lnRef>
-          <a:fillRef idx="1">
-            <a:schemeClr val="accent1"/>
-          </a:fillRef>
-          <a:effectRef idx="0">
-            <a:schemeClr val="accent1"/>
-          </a:effectRef>
-          <a:fontRef idx="minor">
-            <a:schemeClr val="lt1"/>
-          </a:fontRef>
-        </p:style>
-        <p:txBody>
-          <a:bodyPr rtlCol="0" anchor="ctr"/>
-          <a:lstStyle/>
-          <a:p>
-            <a:pPr algn="ctr"/>
-            <a:endParaRPr lang="en-US"/>
-          </a:p>
-        </p:txBody>
-      </p:sp>
-      <p:cxnSp>
-        <p:nvCxnSpPr>
-          <p:cNvPr id="194" name="Elbow Connector 193">
-            <a:extLst>
-              <a:ext uri="{FF2B5EF4-FFF2-40B4-BE49-F238E27FC236}">
-                <a16:creationId xmlns:a16="http://schemas.microsoft.com/office/drawing/2014/main" id="{92E16A28-5785-794C-B42A-86BDB66AD2A3}"/>
-              </a:ext>
-            </a:extLst>
-          </p:cNvPr>
-          <p:cNvCxnSpPr>
-            <a:cxnSpLocks/>
-            <a:stCxn id="195" idx="1"/>
-            <a:endCxn id="196" idx="3"/>
-          </p:cNvCxnSpPr>
-          <p:nvPr/>
-        </p:nvCxnSpPr>
-        <p:spPr>
-          <a:xfrm rot="10800000" flipV="1">
-            <a:off x="6731435" y="1001638"/>
-            <a:ext cx="889787" cy="252174"/>
-          </a:xfrm>
-          <a:prstGeom prst="bentConnector3">
-            <a:avLst>
-              <a:gd name="adj1" fmla="val 50000"/>
-            </a:avLst>
-          </a:prstGeom>
-          <a:ln>
-            <a:headEnd type="triangle" w="med" len="med"/>
-            <a:tailEnd type="none" w="med" len="med"/>
-          </a:ln>
-        </p:spPr>
-        <p:style>
-          <a:lnRef idx="1">
-            <a:schemeClr val="accent1"/>
-          </a:lnRef>
-          <a:fillRef idx="0">
-            <a:schemeClr val="accent1"/>
-          </a:fillRef>
-          <a:effectRef idx="0">
-            <a:schemeClr val="accent1"/>
-          </a:effectRef>
-          <a:fontRef idx="minor">
-            <a:schemeClr val="tx1"/>
-          </a:fontRef>
-        </p:style>
-      </p:cxnSp>
-      <p:sp>
-        <p:nvSpPr>
-          <p:cNvPr id="195" name="Rectangle 194">
-            <a:extLst>
-              <a:ext uri="{FF2B5EF4-FFF2-40B4-BE49-F238E27FC236}">
-                <a16:creationId xmlns:a16="http://schemas.microsoft.com/office/drawing/2014/main" id="{88922A68-C0C8-484B-8356-42B785CAD0EC}"/>
-              </a:ext>
-            </a:extLst>
-          </p:cNvPr>
-          <p:cNvSpPr/>
-          <p:nvPr/>
-        </p:nvSpPr>
-        <p:spPr>
-          <a:xfrm>
-            <a:off x="7621221" y="692697"/>
-            <a:ext cx="728132" cy="617882"/>
-          </a:xfrm>
-          <a:prstGeom prst="rect">
-            <a:avLst/>
-          </a:prstGeom>
-          <a:noFill/>
-          <a:ln>
-            <a:noFill/>
-          </a:ln>
-        </p:spPr>
-        <p:style>
-          <a:lnRef idx="2">
-            <a:schemeClr val="accent1">
-              <a:shade val="50000"/>
-            </a:schemeClr>
-          </a:lnRef>
-          <a:fillRef idx="1">
-            <a:schemeClr val="accent1"/>
-          </a:fillRef>
-          <a:effectRef idx="0">
-            <a:schemeClr val="accent1"/>
-          </a:effectRef>
-          <a:fontRef idx="minor">
-            <a:schemeClr val="lt1"/>
-          </a:fontRef>
-        </p:style>
-        <p:txBody>
-          <a:bodyPr rtlCol="0" anchor="ctr"/>
-          <a:lstStyle/>
-          <a:p>
-            <a:pPr algn="ctr"/>
-            <a:endParaRPr lang="en-US"/>
-          </a:p>
-        </p:txBody>
-      </p:sp>
-      <p:sp>
-        <p:nvSpPr>
-          <p:cNvPr id="196" name="Rectangle 195">
-            <a:extLst>
-              <a:ext uri="{FF2B5EF4-FFF2-40B4-BE49-F238E27FC236}">
-                <a16:creationId xmlns:a16="http://schemas.microsoft.com/office/drawing/2014/main" id="{408C7B59-BEE7-4B4C-B1D7-259ECB893486}"/>
-              </a:ext>
-            </a:extLst>
-          </p:cNvPr>
-          <p:cNvSpPr/>
-          <p:nvPr/>
-        </p:nvSpPr>
-        <p:spPr>
-          <a:xfrm>
-            <a:off x="6003302" y="944871"/>
             <a:ext cx="728132" cy="617882"/>
           </a:xfrm>
           <a:prstGeom prst="rect">

</xml_diff>

<commit_message>
Improve customerCheckout to check if the book in stock before ordering and update the book's stock when ordered
</commit_message>
<xml_diff>
--- a/Look Inna Book Planning.pptx
+++ b/Look Inna Book Planning.pptx
@@ -273,7 +273,7 @@
           <a:p>
             <a:fld id="{F3F0ABEE-AE24-BC40-9DB6-73EEE3EA7525}" type="datetimeFigureOut">
               <a:rPr lang="en-US" smtClean="0"/>
-              <a:t>12/11/21</a:t>
+              <a:t>12/13/21</a:t>
             </a:fld>
             <a:endParaRPr lang="en-US"/>
           </a:p>
@@ -471,7 +471,7 @@
           <a:p>
             <a:fld id="{F3F0ABEE-AE24-BC40-9DB6-73EEE3EA7525}" type="datetimeFigureOut">
               <a:rPr lang="en-US" smtClean="0"/>
-              <a:t>12/11/21</a:t>
+              <a:t>12/13/21</a:t>
             </a:fld>
             <a:endParaRPr lang="en-US"/>
           </a:p>
@@ -679,7 +679,7 @@
           <a:p>
             <a:fld id="{F3F0ABEE-AE24-BC40-9DB6-73EEE3EA7525}" type="datetimeFigureOut">
               <a:rPr lang="en-US" smtClean="0"/>
-              <a:t>12/11/21</a:t>
+              <a:t>12/13/21</a:t>
             </a:fld>
             <a:endParaRPr lang="en-US"/>
           </a:p>
@@ -877,7 +877,7 @@
           <a:p>
             <a:fld id="{F3F0ABEE-AE24-BC40-9DB6-73EEE3EA7525}" type="datetimeFigureOut">
               <a:rPr lang="en-US" smtClean="0"/>
-              <a:t>12/11/21</a:t>
+              <a:t>12/13/21</a:t>
             </a:fld>
             <a:endParaRPr lang="en-US"/>
           </a:p>
@@ -1152,7 +1152,7 @@
           <a:p>
             <a:fld id="{F3F0ABEE-AE24-BC40-9DB6-73EEE3EA7525}" type="datetimeFigureOut">
               <a:rPr lang="en-US" smtClean="0"/>
-              <a:t>12/11/21</a:t>
+              <a:t>12/13/21</a:t>
             </a:fld>
             <a:endParaRPr lang="en-US"/>
           </a:p>
@@ -1417,7 +1417,7 @@
           <a:p>
             <a:fld id="{F3F0ABEE-AE24-BC40-9DB6-73EEE3EA7525}" type="datetimeFigureOut">
               <a:rPr lang="en-US" smtClean="0"/>
-              <a:t>12/11/21</a:t>
+              <a:t>12/13/21</a:t>
             </a:fld>
             <a:endParaRPr lang="en-US"/>
           </a:p>
@@ -1829,7 +1829,7 @@
           <a:p>
             <a:fld id="{F3F0ABEE-AE24-BC40-9DB6-73EEE3EA7525}" type="datetimeFigureOut">
               <a:rPr lang="en-US" smtClean="0"/>
-              <a:t>12/11/21</a:t>
+              <a:t>12/13/21</a:t>
             </a:fld>
             <a:endParaRPr lang="en-US"/>
           </a:p>
@@ -1970,7 +1970,7 @@
           <a:p>
             <a:fld id="{F3F0ABEE-AE24-BC40-9DB6-73EEE3EA7525}" type="datetimeFigureOut">
               <a:rPr lang="en-US" smtClean="0"/>
-              <a:t>12/11/21</a:t>
+              <a:t>12/13/21</a:t>
             </a:fld>
             <a:endParaRPr lang="en-US"/>
           </a:p>
@@ -2083,7 +2083,7 @@
           <a:p>
             <a:fld id="{F3F0ABEE-AE24-BC40-9DB6-73EEE3EA7525}" type="datetimeFigureOut">
               <a:rPr lang="en-US" smtClean="0"/>
-              <a:t>12/11/21</a:t>
+              <a:t>12/13/21</a:t>
             </a:fld>
             <a:endParaRPr lang="en-US"/>
           </a:p>
@@ -2394,7 +2394,7 @@
           <a:p>
             <a:fld id="{F3F0ABEE-AE24-BC40-9DB6-73EEE3EA7525}" type="datetimeFigureOut">
               <a:rPr lang="en-US" smtClean="0"/>
-              <a:t>12/11/21</a:t>
+              <a:t>12/13/21</a:t>
             </a:fld>
             <a:endParaRPr lang="en-US"/>
           </a:p>
@@ -2682,7 +2682,7 @@
           <a:p>
             <a:fld id="{F3F0ABEE-AE24-BC40-9DB6-73EEE3EA7525}" type="datetimeFigureOut">
               <a:rPr lang="en-US" smtClean="0"/>
-              <a:t>12/11/21</a:t>
+              <a:t>12/13/21</a:t>
             </a:fld>
             <a:endParaRPr lang="en-US"/>
           </a:p>
@@ -2923,7 +2923,7 @@
           <a:p>
             <a:fld id="{F3F0ABEE-AE24-BC40-9DB6-73EEE3EA7525}" type="datetimeFigureOut">
               <a:rPr lang="en-US" smtClean="0"/>
-              <a:t>12/11/21</a:t>
+              <a:t>12/13/21</a:t>
             </a:fld>
             <a:endParaRPr lang="en-US"/>
           </a:p>

</xml_diff>

<commit_message>
Complete customer checkout by performing necessary update in balance and sale record, added customer and owner balance, added collection revenue expense and profit
</commit_message>
<xml_diff>
--- a/Look Inna Book Planning.pptx
+++ b/Look Inna Book Planning.pptx
@@ -3726,8 +3726,8 @@
         </p:nvSpPr>
         <p:spPr>
           <a:xfrm>
-            <a:off x="7469433" y="4838744"/>
-            <a:ext cx="1273279" cy="609576"/>
+            <a:off x="7469433" y="4655973"/>
+            <a:ext cx="1273279" cy="970104"/>
           </a:xfrm>
           <a:prstGeom prst="rect">
             <a:avLst/>
@@ -3759,6 +3759,18 @@
           <a:p>
             <a:r>
               <a:rPr lang="en-US" sz="1200" dirty="0" err="1"/>
+              <a:t>bank_account</a:t>
+            </a:r>
+          </a:p>
+          <a:p>
+            <a:r>
+              <a:rPr lang="en-US" sz="1200" dirty="0" err="1"/>
+              <a:t>balance</a:t>
+            </a:r>
+          </a:p>
+          <a:p>
+            <a:r>
+              <a:rPr lang="en-US" sz="1200" dirty="0" err="1"/>
               <a:t>billing_address</a:t>
             </a:r>
             <a:endParaRPr lang="en-US" sz="1200" dirty="0"/>
@@ -3786,7 +3798,7 @@
         </p:nvSpPr>
         <p:spPr>
           <a:xfrm>
-            <a:off x="7469431" y="4596890"/>
+            <a:off x="7469431" y="4414119"/>
             <a:ext cx="1273279" cy="231913"/>
           </a:xfrm>
           <a:prstGeom prst="rect">
@@ -3971,8 +3983,8 @@
         </p:nvSpPr>
         <p:spPr>
           <a:xfrm>
-            <a:off x="7409187" y="1354135"/>
-            <a:ext cx="1273278" cy="978729"/>
+            <a:off x="7409187" y="1226707"/>
+            <a:ext cx="1273278" cy="1106157"/>
           </a:xfrm>
           <a:prstGeom prst="rect">
             <a:avLst/>
@@ -4011,6 +4023,12 @@
           <a:p>
             <a:r>
               <a:rPr lang="en-US" sz="1200" dirty="0"/>
+              <a:t>balance</a:t>
+            </a:r>
+          </a:p>
+          <a:p>
+            <a:r>
+              <a:rPr lang="en-US" sz="1200" dirty="0"/>
               <a:t>address</a:t>
             </a:r>
           </a:p>
@@ -4042,7 +4060,7 @@
         </p:nvSpPr>
         <p:spPr>
           <a:xfrm>
-            <a:off x="7408600" y="1122222"/>
+            <a:off x="7408600" y="1001295"/>
             <a:ext cx="1273279" cy="231913"/>
           </a:xfrm>
           <a:prstGeom prst="rect">
@@ -4221,7 +4239,7 @@
         <p:spPr>
           <a:xfrm>
             <a:off x="7244209" y="5141025"/>
-            <a:ext cx="225224" cy="2507"/>
+            <a:ext cx="225224" cy="0"/>
           </a:xfrm>
           <a:prstGeom prst="line">
             <a:avLst/>
@@ -5444,8 +5462,8 @@
         </p:nvSpPr>
         <p:spPr>
           <a:xfrm>
-            <a:off x="3249386" y="5559620"/>
-            <a:ext cx="1273279" cy="642358"/>
+            <a:off x="3249386" y="5559619"/>
+            <a:ext cx="1273279" cy="948033"/>
           </a:xfrm>
           <a:prstGeom prst="rect">
             <a:avLst/>
@@ -5473,6 +5491,19 @@
               <a:rPr lang="en-US" sz="1200" u="sng" dirty="0"/>
               <a:t>name</a:t>
             </a:r>
+          </a:p>
+          <a:p>
+            <a:r>
+              <a:rPr lang="en-US" sz="1200" dirty="0"/>
+              <a:t>bank_account</a:t>
+            </a:r>
+          </a:p>
+          <a:p>
+            <a:r>
+              <a:rPr lang="en-US" sz="1200" dirty="0"/>
+              <a:t>balance</a:t>
+            </a:r>
+            <a:endParaRPr lang="en-US" sz="1200" u="sng" dirty="0"/>
           </a:p>
           <a:p>
             <a:r>
@@ -5689,8 +5720,8 @@
         </p:nvSpPr>
         <p:spPr>
           <a:xfrm>
-            <a:off x="7621224" y="4551839"/>
-            <a:ext cx="1273278" cy="997840"/>
+            <a:off x="7621224" y="4551838"/>
+            <a:ext cx="1273278" cy="1172883"/>
           </a:xfrm>
           <a:prstGeom prst="rect">
             <a:avLst/>
@@ -5723,6 +5754,12 @@
             <a:r>
               <a:rPr lang="en-US" sz="1200" dirty="0"/>
               <a:t>bank_account</a:t>
+            </a:r>
+          </a:p>
+          <a:p>
+            <a:r>
+              <a:rPr lang="en-US" sz="1200" dirty="0"/>
+              <a:t>balance</a:t>
             </a:r>
           </a:p>
           <a:p>
@@ -6936,7 +6973,7 @@
         <p:spPr>
           <a:xfrm rot="10800000" flipV="1">
             <a:off x="3244698" y="4852611"/>
-            <a:ext cx="12700" cy="872111"/>
+            <a:ext cx="12700" cy="823389"/>
           </a:xfrm>
           <a:prstGeom prst="bentConnector3">
             <a:avLst>
@@ -7026,7 +7063,7 @@
         </p:nvSpPr>
         <p:spPr>
           <a:xfrm>
-            <a:off x="3244698" y="5415782"/>
+            <a:off x="3244698" y="5367060"/>
             <a:ext cx="728132" cy="617882"/>
           </a:xfrm>
           <a:prstGeom prst="rect">

</xml_diff>

<commit_message>
Fix checkout behaviour, addded ownerAddBook, ownerOrderBook, finish ownerShowCollectionAndRecord
</commit_message>
<xml_diff>
--- a/Look Inna Book Planning.pptx
+++ b/Look Inna Book Planning.pptx
@@ -3984,7 +3984,7 @@
         <p:spPr>
           <a:xfrm>
             <a:off x="7409187" y="1226707"/>
-            <a:ext cx="1273278" cy="1106157"/>
+            <a:ext cx="1272691" cy="1106157"/>
           </a:xfrm>
           <a:prstGeom prst="rect">
             <a:avLst/>
@@ -4937,8 +4937,8 @@
         </p:nvCxnSpPr>
         <p:spPr>
           <a:xfrm flipH="1" flipV="1">
-            <a:off x="8045826" y="2332864"/>
-            <a:ext cx="3772" cy="828639"/>
+            <a:off x="8045533" y="2332864"/>
+            <a:ext cx="4065" cy="828639"/>
           </a:xfrm>
           <a:prstGeom prst="line">
             <a:avLst/>
@@ -5047,8 +5047,8 @@
         </p:nvSpPr>
         <p:spPr>
           <a:xfrm>
-            <a:off x="9168294" y="3089205"/>
-            <a:ext cx="1096185" cy="890030"/>
+            <a:off x="9168001" y="2974573"/>
+            <a:ext cx="1096185" cy="1119293"/>
           </a:xfrm>
           <a:prstGeom prst="rect">
             <a:avLst/>
@@ -5087,6 +5087,18 @@
             <a:r>
               <a:rPr lang="en-US" sz="1200" dirty="0"/>
               <a:t>revenue</a:t>
+            </a:r>
+          </a:p>
+          <a:p>
+            <a:r>
+              <a:rPr lang="en-US" sz="1200" dirty="0"/>
+              <a:t>expense</a:t>
+            </a:r>
+          </a:p>
+          <a:p>
+            <a:r>
+              <a:rPr lang="en-US" sz="1200" dirty="0"/>
+              <a:t>profit</a:t>
             </a:r>
           </a:p>
           <a:p>
@@ -5116,7 +5128,7 @@
         <p:spPr>
           <a:xfrm flipH="1">
             <a:off x="8927285" y="3534220"/>
-            <a:ext cx="241009" cy="0"/>
+            <a:ext cx="240716" cy="0"/>
           </a:xfrm>
           <a:prstGeom prst="line">
             <a:avLst/>
@@ -5720,7 +5732,7 @@
         </p:nvSpPr>
         <p:spPr>
           <a:xfrm>
-            <a:off x="7621224" y="4551838"/>
+            <a:off x="7621230" y="4740882"/>
             <a:ext cx="1273278" cy="1172883"/>
           </a:xfrm>
           <a:prstGeom prst="rect">
@@ -5796,7 +5808,7 @@
         </p:nvSpPr>
         <p:spPr>
           <a:xfrm>
-            <a:off x="7621221" y="4319926"/>
+            <a:off x="7621227" y="4508970"/>
             <a:ext cx="1273279" cy="231913"/>
           </a:xfrm>
           <a:prstGeom prst="rect">
@@ -6120,8 +6132,8 @@
         </p:nvSpPr>
         <p:spPr>
           <a:xfrm>
-            <a:off x="7621230" y="2653193"/>
-            <a:ext cx="1273278" cy="1148058"/>
+            <a:off x="7621230" y="2653192"/>
+            <a:ext cx="1273278" cy="1501485"/>
           </a:xfrm>
           <a:prstGeom prst="rect">
             <a:avLst/>
@@ -6172,6 +6184,18 @@
             <a:r>
               <a:rPr lang="en-CA" sz="1200"/>
               <a:t>revenue</a:t>
+            </a:r>
+          </a:p>
+          <a:p>
+            <a:r>
+              <a:rPr lang="en-CA" sz="1200"/>
+              <a:t>expense</a:t>
+            </a:r>
+          </a:p>
+          <a:p>
+            <a:r>
+              <a:rPr lang="en-CA" sz="1200"/>
+              <a:t>profit</a:t>
             </a:r>
           </a:p>
           <a:p>
@@ -7261,13 +7285,13 @@
           <p:nvPr/>
         </p:nvCxnSpPr>
         <p:spPr>
-          <a:xfrm rot="10800000" flipV="1">
+          <a:xfrm rot="10800000" flipH="1" flipV="1">
             <a:off x="7616541" y="2952195"/>
-            <a:ext cx="12700" cy="1718644"/>
+            <a:ext cx="6" cy="1907688"/>
           </a:xfrm>
           <a:prstGeom prst="bentConnector3">
             <a:avLst>
-              <a:gd name="adj1" fmla="val 1800000"/>
+              <a:gd name="adj1" fmla="val -3810000000"/>
             </a:avLst>
           </a:prstGeom>
           <a:ln>
@@ -7353,7 +7377,7 @@
         </p:nvSpPr>
         <p:spPr>
           <a:xfrm>
-            <a:off x="7616541" y="4361898"/>
+            <a:off x="7616547" y="4550942"/>
             <a:ext cx="728132" cy="617882"/>
           </a:xfrm>
           <a:prstGeom prst="rect">

</xml_diff>

<commit_message>
Added customer browse book by book name, isbn, author, genre, publisher. Plus, fix a couple things and clean up JDBCController
</commit_message>
<xml_diff>
--- a/Look Inna Book Planning.pptx
+++ b/Look Inna Book Planning.pptx
@@ -273,7 +273,7 @@
           <a:p>
             <a:fld id="{F3F0ABEE-AE24-BC40-9DB6-73EEE3EA7525}" type="datetimeFigureOut">
               <a:rPr lang="en-US" smtClean="0"/>
-              <a:t>12/13/21</a:t>
+              <a:t>12/18/21</a:t>
             </a:fld>
             <a:endParaRPr lang="en-US"/>
           </a:p>
@@ -471,7 +471,7 @@
           <a:p>
             <a:fld id="{F3F0ABEE-AE24-BC40-9DB6-73EEE3EA7525}" type="datetimeFigureOut">
               <a:rPr lang="en-US" smtClean="0"/>
-              <a:t>12/13/21</a:t>
+              <a:t>12/18/21</a:t>
             </a:fld>
             <a:endParaRPr lang="en-US"/>
           </a:p>
@@ -679,7 +679,7 @@
           <a:p>
             <a:fld id="{F3F0ABEE-AE24-BC40-9DB6-73EEE3EA7525}" type="datetimeFigureOut">
               <a:rPr lang="en-US" smtClean="0"/>
-              <a:t>12/13/21</a:t>
+              <a:t>12/18/21</a:t>
             </a:fld>
             <a:endParaRPr lang="en-US"/>
           </a:p>
@@ -877,7 +877,7 @@
           <a:p>
             <a:fld id="{F3F0ABEE-AE24-BC40-9DB6-73EEE3EA7525}" type="datetimeFigureOut">
               <a:rPr lang="en-US" smtClean="0"/>
-              <a:t>12/13/21</a:t>
+              <a:t>12/18/21</a:t>
             </a:fld>
             <a:endParaRPr lang="en-US"/>
           </a:p>
@@ -1152,7 +1152,7 @@
           <a:p>
             <a:fld id="{F3F0ABEE-AE24-BC40-9DB6-73EEE3EA7525}" type="datetimeFigureOut">
               <a:rPr lang="en-US" smtClean="0"/>
-              <a:t>12/13/21</a:t>
+              <a:t>12/18/21</a:t>
             </a:fld>
             <a:endParaRPr lang="en-US"/>
           </a:p>
@@ -1417,7 +1417,7 @@
           <a:p>
             <a:fld id="{F3F0ABEE-AE24-BC40-9DB6-73EEE3EA7525}" type="datetimeFigureOut">
               <a:rPr lang="en-US" smtClean="0"/>
-              <a:t>12/13/21</a:t>
+              <a:t>12/18/21</a:t>
             </a:fld>
             <a:endParaRPr lang="en-US"/>
           </a:p>
@@ -1829,7 +1829,7 @@
           <a:p>
             <a:fld id="{F3F0ABEE-AE24-BC40-9DB6-73EEE3EA7525}" type="datetimeFigureOut">
               <a:rPr lang="en-US" smtClean="0"/>
-              <a:t>12/13/21</a:t>
+              <a:t>12/18/21</a:t>
             </a:fld>
             <a:endParaRPr lang="en-US"/>
           </a:p>
@@ -1970,7 +1970,7 @@
           <a:p>
             <a:fld id="{F3F0ABEE-AE24-BC40-9DB6-73EEE3EA7525}" type="datetimeFigureOut">
               <a:rPr lang="en-US" smtClean="0"/>
-              <a:t>12/13/21</a:t>
+              <a:t>12/18/21</a:t>
             </a:fld>
             <a:endParaRPr lang="en-US"/>
           </a:p>
@@ -2083,7 +2083,7 @@
           <a:p>
             <a:fld id="{F3F0ABEE-AE24-BC40-9DB6-73EEE3EA7525}" type="datetimeFigureOut">
               <a:rPr lang="en-US" smtClean="0"/>
-              <a:t>12/13/21</a:t>
+              <a:t>12/18/21</a:t>
             </a:fld>
             <a:endParaRPr lang="en-US"/>
           </a:p>
@@ -2394,7 +2394,7 @@
           <a:p>
             <a:fld id="{F3F0ABEE-AE24-BC40-9DB6-73EEE3EA7525}" type="datetimeFigureOut">
               <a:rPr lang="en-US" smtClean="0"/>
-              <a:t>12/13/21</a:t>
+              <a:t>12/18/21</a:t>
             </a:fld>
             <a:endParaRPr lang="en-US"/>
           </a:p>
@@ -2682,7 +2682,7 @@
           <a:p>
             <a:fld id="{F3F0ABEE-AE24-BC40-9DB6-73EEE3EA7525}" type="datetimeFigureOut">
               <a:rPr lang="en-US" smtClean="0"/>
-              <a:t>12/13/21</a:t>
+              <a:t>12/18/21</a:t>
             </a:fld>
             <a:endParaRPr lang="en-US"/>
           </a:p>
@@ -2923,7 +2923,7 @@
           <a:p>
             <a:fld id="{F3F0ABEE-AE24-BC40-9DB6-73EEE3EA7525}" type="datetimeFigureOut">
               <a:rPr lang="en-US" smtClean="0"/>
-              <a:t>12/13/21</a:t>
+              <a:t>12/18/21</a:t>
             </a:fld>
             <a:endParaRPr lang="en-US"/>
           </a:p>

</xml_diff>